<commit_message>
Updated DevLog and changed some code formatting
</commit_message>
<xml_diff>
--- a/Enter the Deep Devlog.pptx
+++ b/Enter the Deep Devlog.pptx
@@ -10,6 +10,7 @@
     <p:sldId id="258" r:id="rId4"/>
     <p:sldId id="259" r:id="rId5"/>
     <p:sldId id="260" r:id="rId6"/>
+    <p:sldId id="261" r:id="rId7"/>
   </p:sldIdLst>
   <p:sldSz cx="12192000" cy="6858000"/>
   <p:notesSz cx="6858000" cy="9144000"/>
@@ -272,7 +273,7 @@
           <a:p>
             <a:fld id="{5E7AA473-D82F-4EFF-9DF7-AE6D83C51288}" type="datetime1">
               <a:rPr lang="en-US" smtClean="0"/>
-              <a:t>6/2/2021</a:t>
+              <a:t>6/12/2021</a:t>
             </a:fld>
             <a:endParaRPr lang="en-US"/>
           </a:p>
@@ -526,7 +527,7 @@
           <a:p>
             <a:fld id="{1E12F1F0-FE2D-4C1C-B320-8CB9BE735F0F}" type="datetime1">
               <a:rPr lang="en-US" smtClean="0"/>
-              <a:t>6/2/2021</a:t>
+              <a:t>6/12/2021</a:t>
             </a:fld>
             <a:endParaRPr lang="en-US"/>
           </a:p>
@@ -794,7 +795,7 @@
           <a:p>
             <a:fld id="{2CF1B96C-10FD-4EBC-9029-9652B7535D02}" type="datetime1">
               <a:rPr lang="en-US" smtClean="0"/>
-              <a:t>6/2/2021</a:t>
+              <a:t>6/12/2021</a:t>
             </a:fld>
             <a:endParaRPr lang="en-US"/>
           </a:p>
@@ -1048,7 +1049,7 @@
           <a:p>
             <a:fld id="{14878474-CC00-4A95-9D50-A41C12D1EEC4}" type="datetime1">
               <a:rPr lang="en-US" smtClean="0"/>
-              <a:t>6/2/2021</a:t>
+              <a:t>6/12/2021</a:t>
             </a:fld>
             <a:endParaRPr lang="en-US"/>
           </a:p>
@@ -1326,7 +1327,7 @@
           <a:p>
             <a:fld id="{7F38C8B4-7FBB-408F-BDB9-F0496874AFB2}" type="datetime1">
               <a:rPr lang="en-US" smtClean="0"/>
-              <a:t>6/2/2021</a:t>
+              <a:t>6/12/2021</a:t>
             </a:fld>
             <a:endParaRPr lang="en-US"/>
           </a:p>
@@ -1598,7 +1599,7 @@
           <a:p>
             <a:fld id="{2BB8EE20-A5E2-47D3-8F6D-A2BA7AB2E093}" type="datetime1">
               <a:rPr lang="en-US" smtClean="0"/>
-              <a:t>6/2/2021</a:t>
+              <a:t>6/12/2021</a:t>
             </a:fld>
             <a:endParaRPr lang="en-US"/>
           </a:p>
@@ -2156,7 +2157,7 @@
           <a:p>
             <a:fld id="{3382CF99-132F-413F-B7EF-71A5C33F2ED6}" type="datetime1">
               <a:rPr lang="en-US" smtClean="0"/>
-              <a:t>6/2/2021</a:t>
+              <a:t>6/12/2021</a:t>
             </a:fld>
             <a:endParaRPr lang="en-US"/>
           </a:p>
@@ -2298,7 +2299,7 @@
           <a:p>
             <a:fld id="{1F17AE06-98E0-4D9F-A059-92C3548821BB}" type="datetime1">
               <a:rPr lang="en-US" smtClean="0"/>
-              <a:t>6/2/2021</a:t>
+              <a:t>6/12/2021</a:t>
             </a:fld>
             <a:endParaRPr lang="en-US"/>
           </a:p>
@@ -2411,7 +2412,7 @@
           <a:p>
             <a:fld id="{FFBA00CA-3DDC-4705-B840-978EF5EA0707}" type="datetime1">
               <a:rPr lang="en-US" smtClean="0"/>
-              <a:t>6/2/2021</a:t>
+              <a:t>6/12/2021</a:t>
             </a:fld>
             <a:endParaRPr lang="en-US"/>
           </a:p>
@@ -2730,7 +2731,7 @@
           <a:p>
             <a:fld id="{FC366D49-0BBA-4C5A-AD96-6448CA63451A}" type="datetime1">
               <a:rPr lang="en-US" smtClean="0"/>
-              <a:t>6/2/2021</a:t>
+              <a:t>6/12/2021</a:t>
             </a:fld>
             <a:endParaRPr lang="en-US"/>
           </a:p>
@@ -3027,7 +3028,7 @@
           <a:p>
             <a:fld id="{4F4EB293-A316-472D-A8B4-6947CF1A12B7}" type="datetime1">
               <a:rPr lang="en-US" smtClean="0"/>
-              <a:t>6/2/2021</a:t>
+              <a:t>6/12/2021</a:t>
             </a:fld>
             <a:endParaRPr lang="en-US"/>
           </a:p>
@@ -3306,7 +3307,7 @@
           <a:p>
             <a:fld id="{734BCCD4-CEB1-405B-A443-DD9CBCBEA552}" type="datetime1">
               <a:rPr lang="en-US" smtClean="0"/>
-              <a:t>6/2/2021</a:t>
+              <a:t>6/12/2021</a:t>
             </a:fld>
             <a:endParaRPr lang="en-US"/>
           </a:p>
@@ -5661,6 +5662,160 @@
 </p:sld>
 </file>
 
+<file path=ppt/slides/slide6.xml><?xml version="1.0" encoding="utf-8"?>
+<p:sld xmlns:a="http://schemas.openxmlformats.org/drawingml/2006/main" xmlns:r="http://schemas.openxmlformats.org/officeDocument/2006/relationships" xmlns:p="http://schemas.openxmlformats.org/presentationml/2006/main">
+  <p:cSld>
+    <p:spTree>
+      <p:nvGrpSpPr>
+        <p:cNvPr id="1" name=""/>
+        <p:cNvGrpSpPr/>
+        <p:nvPr/>
+      </p:nvGrpSpPr>
+      <p:grpSpPr>
+        <a:xfrm>
+          <a:off x="0" y="0"/>
+          <a:ext cx="0" cy="0"/>
+          <a:chOff x="0" y="0"/>
+          <a:chExt cx="0" cy="0"/>
+        </a:xfrm>
+      </p:grpSpPr>
+      <p:sp>
+        <p:nvSpPr>
+          <p:cNvPr id="2" name="Title 1">
+            <a:extLst>
+              <a:ext uri="{FF2B5EF4-FFF2-40B4-BE49-F238E27FC236}">
+                <a16:creationId xmlns:a16="http://schemas.microsoft.com/office/drawing/2014/main" id="{9DE1A314-D25C-4002-9519-85045AB5182D}"/>
+              </a:ext>
+            </a:extLst>
+          </p:cNvPr>
+          <p:cNvSpPr>
+            <a:spLocks noGrp="1"/>
+          </p:cNvSpPr>
+          <p:nvPr>
+            <p:ph type="title"/>
+          </p:nvPr>
+        </p:nvSpPr>
+        <p:spPr/>
+        <p:txBody>
+          <a:bodyPr/>
+          <a:lstStyle/>
+          <a:p>
+            <a:r>
+              <a:rPr lang="en-GB" dirty="0"/>
+              <a:t>Physics</a:t>
+            </a:r>
+          </a:p>
+        </p:txBody>
+      </p:sp>
+      <p:sp>
+        <p:nvSpPr>
+          <p:cNvPr id="3" name="Content Placeholder 2">
+            <a:extLst>
+              <a:ext uri="{FF2B5EF4-FFF2-40B4-BE49-F238E27FC236}">
+                <a16:creationId xmlns:a16="http://schemas.microsoft.com/office/drawing/2014/main" id="{0D4BEC63-E738-45B5-8097-5280B098E6B3}"/>
+              </a:ext>
+            </a:extLst>
+          </p:cNvPr>
+          <p:cNvSpPr>
+            <a:spLocks noGrp="1"/>
+          </p:cNvSpPr>
+          <p:nvPr>
+            <p:ph idx="1"/>
+          </p:nvPr>
+        </p:nvSpPr>
+        <p:spPr/>
+        <p:txBody>
+          <a:bodyPr>
+            <a:normAutofit fontScale="92500" lnSpcReduction="20000"/>
+          </a:bodyPr>
+          <a:lstStyle/>
+          <a:p>
+            <a:pPr marL="342900" indent="-342900">
+              <a:buFont typeface="Symbol" panose="05050102010706020507" pitchFamily="18" charset="2"/>
+              <a:buChar char="Þ"/>
+            </a:pPr>
+            <a:r>
+              <a:rPr lang="en-GB" dirty="0"/>
+              <a:t>Separation of Physics Objects and Entities</a:t>
+            </a:r>
+          </a:p>
+          <a:p>
+            <a:pPr marL="342900" indent="-342900">
+              <a:buFont typeface="Symbol" panose="05050102010706020507" pitchFamily="18" charset="2"/>
+              <a:buChar char="Þ"/>
+            </a:pPr>
+            <a:r>
+              <a:rPr lang="en-GB" dirty="0"/>
+              <a:t>Have Entities own the physics objects they require (similar to </a:t>
+            </a:r>
+            <a:r>
+              <a:rPr lang="en-GB" dirty="0" err="1"/>
+              <a:t>bodychunks</a:t>
+            </a:r>
+            <a:r>
+              <a:rPr lang="en-GB" dirty="0"/>
+              <a:t> in </a:t>
+            </a:r>
+            <a:r>
+              <a:rPr lang="en-GB" dirty="0" err="1"/>
+              <a:t>rainworld</a:t>
+            </a:r>
+            <a:r>
+              <a:rPr lang="en-GB" dirty="0"/>
+              <a:t>) and have active physics objects referred to in the </a:t>
+            </a:r>
+            <a:r>
+              <a:rPr lang="en-GB" dirty="0" err="1"/>
+              <a:t>physicsworld</a:t>
+            </a:r>
+            <a:r>
+              <a:rPr lang="en-GB" dirty="0"/>
+              <a:t> and entities control whether they are active or not.</a:t>
+            </a:r>
+          </a:p>
+          <a:p>
+            <a:pPr marL="342900" indent="-342900">
+              <a:buFont typeface="Symbol" panose="05050102010706020507" pitchFamily="18" charset="2"/>
+              <a:buChar char="Þ"/>
+            </a:pPr>
+            <a:r>
+              <a:rPr lang="en-GB" dirty="0"/>
+              <a:t>For performance in the case of data oriented design, have all physics objects stored in the physics world where entities have pointers to them such that all physics objects are together and all </a:t>
+            </a:r>
+            <a:r>
+              <a:rPr lang="en-GB" dirty="0" err="1"/>
+              <a:t>entites</a:t>
+            </a:r>
+            <a:r>
+              <a:rPr lang="en-GB" dirty="0"/>
+              <a:t> are together</a:t>
+            </a:r>
+          </a:p>
+          <a:p>
+            <a:pPr marL="617220" lvl="1" indent="-342900">
+              <a:buFont typeface="Symbol" panose="05050102010706020507" pitchFamily="18" charset="2"/>
+              <a:buChar char="Þ"/>
+            </a:pPr>
+            <a:r>
+              <a:rPr lang="en-GB" dirty="0"/>
+              <a:t>Might need to reconfigure stuff like this when it comes to true data oriented design where all positions are put together, all velocities are put together etc…</a:t>
+            </a:r>
+          </a:p>
+        </p:txBody>
+      </p:sp>
+    </p:spTree>
+    <p:extLst>
+      <p:ext uri="{BB962C8B-B14F-4D97-AF65-F5344CB8AC3E}">
+        <p14:creationId xmlns:p14="http://schemas.microsoft.com/office/powerpoint/2010/main" val="2678278292"/>
+      </p:ext>
+    </p:extLst>
+  </p:cSld>
+  <p:clrMapOvr>
+    <a:masterClrMapping/>
+  </p:clrMapOvr>
+</p:sld>
+</file>
+
 <file path=ppt/theme/theme1.xml><?xml version="1.0" encoding="utf-8"?>
 <a:theme xmlns:a="http://schemas.openxmlformats.org/drawingml/2006/main" name="GestaltVTI">
   <a:themeElements>

</xml_diff>

<commit_message>
Implemented very basic ECS design.
Includes adding components and creating entities.

Does not yet implement proper archetype allocation and deallocation, nor does it implement proper abstraction for entity and component creation.
</commit_message>
<xml_diff>
--- a/Enter the Deep Devlog.pptx
+++ b/Enter the Deep Devlog.pptx
@@ -12,6 +12,7 @@
     <p:sldId id="260" r:id="rId6"/>
     <p:sldId id="261" r:id="rId7"/>
     <p:sldId id="262" r:id="rId8"/>
+    <p:sldId id="263" r:id="rId9"/>
   </p:sldIdLst>
   <p:sldSz cx="12192000" cy="6858000"/>
   <p:notesSz cx="6858000" cy="9144000"/>
@@ -274,7 +275,7 @@
           <a:p>
             <a:fld id="{5E7AA473-D82F-4EFF-9DF7-AE6D83C51288}" type="datetime1">
               <a:rPr lang="en-US" smtClean="0"/>
-              <a:t>6/13/2021</a:t>
+              <a:t>6/30/2021</a:t>
             </a:fld>
             <a:endParaRPr lang="en-US"/>
           </a:p>
@@ -528,7 +529,7 @@
           <a:p>
             <a:fld id="{1E12F1F0-FE2D-4C1C-B320-8CB9BE735F0F}" type="datetime1">
               <a:rPr lang="en-US" smtClean="0"/>
-              <a:t>6/13/2021</a:t>
+              <a:t>6/30/2021</a:t>
             </a:fld>
             <a:endParaRPr lang="en-US"/>
           </a:p>
@@ -796,7 +797,7 @@
           <a:p>
             <a:fld id="{2CF1B96C-10FD-4EBC-9029-9652B7535D02}" type="datetime1">
               <a:rPr lang="en-US" smtClean="0"/>
-              <a:t>6/13/2021</a:t>
+              <a:t>6/30/2021</a:t>
             </a:fld>
             <a:endParaRPr lang="en-US"/>
           </a:p>
@@ -1050,7 +1051,7 @@
           <a:p>
             <a:fld id="{14878474-CC00-4A95-9D50-A41C12D1EEC4}" type="datetime1">
               <a:rPr lang="en-US" smtClean="0"/>
-              <a:t>6/13/2021</a:t>
+              <a:t>6/30/2021</a:t>
             </a:fld>
             <a:endParaRPr lang="en-US"/>
           </a:p>
@@ -1328,7 +1329,7 @@
           <a:p>
             <a:fld id="{7F38C8B4-7FBB-408F-BDB9-F0496874AFB2}" type="datetime1">
               <a:rPr lang="en-US" smtClean="0"/>
-              <a:t>6/13/2021</a:t>
+              <a:t>6/30/2021</a:t>
             </a:fld>
             <a:endParaRPr lang="en-US"/>
           </a:p>
@@ -1600,7 +1601,7 @@
           <a:p>
             <a:fld id="{2BB8EE20-A5E2-47D3-8F6D-A2BA7AB2E093}" type="datetime1">
               <a:rPr lang="en-US" smtClean="0"/>
-              <a:t>6/13/2021</a:t>
+              <a:t>6/30/2021</a:t>
             </a:fld>
             <a:endParaRPr lang="en-US"/>
           </a:p>
@@ -2158,7 +2159,7 @@
           <a:p>
             <a:fld id="{3382CF99-132F-413F-B7EF-71A5C33F2ED6}" type="datetime1">
               <a:rPr lang="en-US" smtClean="0"/>
-              <a:t>6/13/2021</a:t>
+              <a:t>6/30/2021</a:t>
             </a:fld>
             <a:endParaRPr lang="en-US"/>
           </a:p>
@@ -2300,7 +2301,7 @@
           <a:p>
             <a:fld id="{1F17AE06-98E0-4D9F-A059-92C3548821BB}" type="datetime1">
               <a:rPr lang="en-US" smtClean="0"/>
-              <a:t>6/13/2021</a:t>
+              <a:t>6/30/2021</a:t>
             </a:fld>
             <a:endParaRPr lang="en-US"/>
           </a:p>
@@ -2413,7 +2414,7 @@
           <a:p>
             <a:fld id="{FFBA00CA-3DDC-4705-B840-978EF5EA0707}" type="datetime1">
               <a:rPr lang="en-US" smtClean="0"/>
-              <a:t>6/13/2021</a:t>
+              <a:t>6/30/2021</a:t>
             </a:fld>
             <a:endParaRPr lang="en-US"/>
           </a:p>
@@ -2732,7 +2733,7 @@
           <a:p>
             <a:fld id="{FC366D49-0BBA-4C5A-AD96-6448CA63451A}" type="datetime1">
               <a:rPr lang="en-US" smtClean="0"/>
-              <a:t>6/13/2021</a:t>
+              <a:t>6/30/2021</a:t>
             </a:fld>
             <a:endParaRPr lang="en-US"/>
           </a:p>
@@ -3029,7 +3030,7 @@
           <a:p>
             <a:fld id="{4F4EB293-A316-472D-A8B4-6947CF1A12B7}" type="datetime1">
               <a:rPr lang="en-US" smtClean="0"/>
-              <a:t>6/13/2021</a:t>
+              <a:t>6/30/2021</a:t>
             </a:fld>
             <a:endParaRPr lang="en-US"/>
           </a:p>
@@ -3308,7 +3309,7 @@
           <a:p>
             <a:fld id="{734BCCD4-CEB1-405B-A443-DD9CBCBEA552}" type="datetime1">
               <a:rPr lang="en-US" smtClean="0"/>
-              <a:t>6/13/2021</a:t>
+              <a:t>6/30/2021</a:t>
             </a:fld>
             <a:endParaRPr lang="en-US"/>
           </a:p>
@@ -4870,7 +4871,7 @@
         <p:spPr>
           <a:xfrm>
             <a:off x="5972175" y="197346"/>
-            <a:ext cx="5953125" cy="6555641"/>
+            <a:ext cx="5953125" cy="5816977"/>
           </a:xfrm>
           <a:prstGeom prst="rect">
             <a:avLst/>
@@ -4884,16 +4885,16 @@
           <a:lstStyle/>
           <a:p>
             <a:r>
-              <a:rPr lang="en-GB" sz="1400" dirty="0"/>
+              <a:rPr lang="en-GB" sz="1200" dirty="0"/>
               <a:t>As discussed before big problems with unity engine, thus writing my own.</a:t>
             </a:r>
           </a:p>
           <a:p>
-            <a:endParaRPr lang="en-GB" sz="1400" dirty="0"/>
-          </a:p>
-          <a:p>
-            <a:r>
-              <a:rPr lang="en-GB" sz="1400" dirty="0"/>
+            <a:endParaRPr lang="en-GB" sz="1200" dirty="0"/>
+          </a:p>
+          <a:p>
+            <a:r>
+              <a:rPr lang="en-GB" sz="1200" dirty="0"/>
               <a:t>Languages: </a:t>
             </a:r>
           </a:p>
@@ -4903,7 +4904,7 @@
               <a:buChar char="Þ"/>
             </a:pPr>
             <a:r>
-              <a:rPr lang="en-GB" sz="1400" dirty="0"/>
+              <a:rPr lang="en-GB" sz="1200" dirty="0"/>
               <a:t>C#</a:t>
             </a:r>
           </a:p>
@@ -4913,15 +4914,15 @@
               <a:buChar char="Þ"/>
             </a:pPr>
             <a:r>
-              <a:rPr lang="en-GB" sz="1400" dirty="0"/>
+              <a:rPr lang="en-GB" sz="1200" dirty="0"/>
               <a:t>I know what </a:t>
             </a:r>
             <a:r>
-              <a:rPr lang="en-GB" sz="1400" dirty="0" err="1"/>
+              <a:rPr lang="en-GB" sz="1200" dirty="0" err="1"/>
               <a:t>im</a:t>
             </a:r>
             <a:r>
-              <a:rPr lang="en-GB" sz="1400" dirty="0"/>
+              <a:rPr lang="en-GB" sz="1200" dirty="0"/>
               <a:t> doing</a:t>
             </a:r>
           </a:p>
@@ -4931,7 +4932,7 @@
               <a:buChar char="Þ"/>
             </a:pPr>
             <a:r>
-              <a:rPr lang="en-GB" sz="1400" dirty="0"/>
+              <a:rPr lang="en-GB" sz="1200" dirty="0"/>
               <a:t>Slower and less control over  optimization decisions</a:t>
             </a:r>
           </a:p>
@@ -4941,15 +4942,15 @@
               <a:buChar char="Þ"/>
             </a:pPr>
             <a:r>
-              <a:rPr lang="en-GB" sz="1400" dirty="0"/>
+              <a:rPr lang="en-GB" sz="1200" dirty="0"/>
               <a:t>A lot more </a:t>
             </a:r>
             <a:r>
-              <a:rPr lang="en-GB" sz="1400" dirty="0" err="1"/>
+              <a:rPr lang="en-GB" sz="1200" dirty="0" err="1"/>
               <a:t>c++</a:t>
             </a:r>
             <a:r>
-              <a:rPr lang="en-GB" sz="1400" dirty="0"/>
+              <a:rPr lang="en-GB" sz="1200" dirty="0"/>
               <a:t> support is given for stuff like game engines</a:t>
             </a:r>
           </a:p>
@@ -4959,7 +4960,7 @@
               <a:buChar char="Þ"/>
             </a:pPr>
             <a:r>
-              <a:rPr lang="en-GB" sz="1400" dirty="0"/>
+              <a:rPr lang="en-GB" sz="1200" dirty="0"/>
               <a:t>C++</a:t>
             </a:r>
           </a:p>
@@ -4969,15 +4970,15 @@
               <a:buChar char="Þ"/>
             </a:pPr>
             <a:r>
-              <a:rPr lang="en-GB" sz="1400" dirty="0"/>
+              <a:rPr lang="en-GB" sz="1200" dirty="0"/>
               <a:t>No idea what </a:t>
             </a:r>
             <a:r>
-              <a:rPr lang="en-GB" sz="1400" dirty="0" err="1"/>
+              <a:rPr lang="en-GB" sz="1200" dirty="0" err="1"/>
               <a:t>im</a:t>
             </a:r>
             <a:r>
-              <a:rPr lang="en-GB" sz="1400" dirty="0"/>
+              <a:rPr lang="en-GB" sz="1200" dirty="0"/>
               <a:t> doing</a:t>
             </a:r>
           </a:p>
@@ -4987,7 +4988,7 @@
               <a:buChar char="Þ"/>
             </a:pPr>
             <a:r>
-              <a:rPr lang="en-GB" sz="1400" dirty="0"/>
+              <a:rPr lang="en-GB" sz="1200" dirty="0"/>
               <a:t>Greater control</a:t>
             </a:r>
           </a:p>
@@ -4997,7 +4998,7 @@
               <a:buChar char="Þ"/>
             </a:pPr>
             <a:r>
-              <a:rPr lang="en-GB" sz="1400" dirty="0"/>
+              <a:rPr lang="en-GB" sz="1200" dirty="0"/>
               <a:t>A lot more support</a:t>
             </a:r>
           </a:p>
@@ -5006,11 +5007,39 @@
               <a:buFont typeface="Symbol" panose="05050102010706020507" pitchFamily="18" charset="2"/>
               <a:buChar char="Þ"/>
             </a:pPr>
-            <a:endParaRPr lang="en-GB" sz="1400" dirty="0"/>
-          </a:p>
-          <a:p>
-            <a:r>
-              <a:rPr lang="en-GB" sz="1400" dirty="0"/>
+            <a:r>
+              <a:rPr lang="en-GB" sz="1200" dirty="0"/>
+              <a:t>Able to use systems like </a:t>
+            </a:r>
+            <a:r>
+              <a:rPr lang="en-GB" sz="1200" dirty="0" err="1"/>
+              <a:t>openmp</a:t>
+            </a:r>
+            <a:r>
+              <a:rPr lang="en-GB" sz="1200" dirty="0"/>
+              <a:t> (will need to run separate tests to check performance difference between handcrafted threads etc)</a:t>
+            </a:r>
+          </a:p>
+          <a:p>
+            <a:pPr marL="742950" lvl="1" indent="-285750">
+              <a:buFont typeface="Symbol" panose="05050102010706020507" pitchFamily="18" charset="2"/>
+              <a:buChar char="Þ"/>
+            </a:pPr>
+            <a:r>
+              <a:rPr lang="en-GB" sz="1200" dirty="0"/>
+              <a:t>Able to abuse SIMD and AVX AVX2 (advanced vector instructions etc)</a:t>
+            </a:r>
+          </a:p>
+          <a:p>
+            <a:pPr marL="742950" lvl="1" indent="-285750">
+              <a:buFont typeface="Symbol" panose="05050102010706020507" pitchFamily="18" charset="2"/>
+              <a:buChar char="Þ"/>
+            </a:pPr>
+            <a:endParaRPr lang="en-GB" sz="1200" dirty="0"/>
+          </a:p>
+          <a:p>
+            <a:r>
+              <a:rPr lang="en-GB" sz="1200" dirty="0"/>
               <a:t>To solve the problem of rendering:</a:t>
             </a:r>
           </a:p>
@@ -5020,7 +5049,7 @@
               <a:buChar char="Þ"/>
             </a:pPr>
             <a:r>
-              <a:rPr lang="en-US" sz="1400" b="0" i="0" dirty="0">
+              <a:rPr lang="en-US" sz="1200" b="0" i="0" dirty="0">
                 <a:solidFill>
                   <a:srgbClr val="000000"/>
                 </a:solidFill>
@@ -5030,7 +5059,7 @@
               <a:t>the server and game engine with simulation </a:t>
             </a:r>
             <a:r>
-              <a:rPr lang="en-US" sz="1400" b="0" i="0" dirty="0" err="1">
+              <a:rPr lang="en-US" sz="1200" b="0" i="0" dirty="0" err="1">
                 <a:solidFill>
                   <a:srgbClr val="000000"/>
                 </a:solidFill>
@@ -5040,7 +5069,7 @@
               <a:t>etc</a:t>
             </a:r>
             <a:r>
-              <a:rPr lang="en-US" sz="1400" b="0" i="0" dirty="0">
+              <a:rPr lang="en-US" sz="1200" b="0" i="0" dirty="0">
                 <a:solidFill>
                   <a:srgbClr val="000000"/>
                 </a:solidFill>
@@ -5050,7 +5079,7 @@
               <a:t> can be written in </a:t>
             </a:r>
             <a:r>
-              <a:rPr lang="en-US" sz="1400" b="0" i="0" dirty="0" err="1">
+              <a:rPr lang="en-US" sz="1200" b="0" i="0" dirty="0" err="1">
                 <a:solidFill>
                   <a:srgbClr val="000000"/>
                 </a:solidFill>
@@ -5060,7 +5089,7 @@
               <a:t>c++</a:t>
             </a:r>
             <a:r>
-              <a:rPr lang="en-US" sz="1400" b="0" i="0" dirty="0">
+              <a:rPr lang="en-US" sz="1200" b="0" i="0" dirty="0">
                 <a:solidFill>
                   <a:srgbClr val="000000"/>
                 </a:solidFill>
@@ -5076,7 +5105,7 @@
               <a:buChar char="Þ"/>
             </a:pPr>
             <a:r>
-              <a:rPr lang="en-US" sz="1400" dirty="0">
+              <a:rPr lang="en-US" sz="1200" dirty="0">
                 <a:solidFill>
                   <a:srgbClr val="000000"/>
                 </a:solidFill>
@@ -5085,7 +5114,7 @@
               <a:t>I</a:t>
             </a:r>
             <a:r>
-              <a:rPr lang="en-US" sz="1400" b="0" i="0" dirty="0">
+              <a:rPr lang="en-US" sz="1200" b="0" i="0" dirty="0">
                 <a:solidFill>
                   <a:srgbClr val="000000"/>
                 </a:solidFill>
@@ -5101,7 +5130,7 @@
               <a:buChar char="Þ"/>
             </a:pPr>
             <a:r>
-              <a:rPr lang="en-US" sz="1400" b="0" i="0" dirty="0">
+              <a:rPr lang="en-US" sz="1200" b="0" i="0" dirty="0">
                 <a:solidFill>
                   <a:srgbClr val="000000"/>
                 </a:solidFill>
@@ -5111,7 +5140,7 @@
               <a:t>the </a:t>
             </a:r>
             <a:r>
-              <a:rPr lang="en-US" sz="1400" b="0" i="0" dirty="0" err="1">
+              <a:rPr lang="en-US" sz="1200" b="0" i="0" dirty="0" err="1">
                 <a:solidFill>
                   <a:srgbClr val="000000"/>
                 </a:solidFill>
@@ -5121,7 +5150,7 @@
               <a:t>c++</a:t>
             </a:r>
             <a:r>
-              <a:rPr lang="en-US" sz="1400" b="0" i="0" dirty="0">
+              <a:rPr lang="en-US" sz="1200" b="0" i="0" dirty="0">
                 <a:solidFill>
                   <a:srgbClr val="000000"/>
                 </a:solidFill>
@@ -5131,7 +5160,7 @@
               <a:t> server can send </a:t>
             </a:r>
             <a:r>
-              <a:rPr lang="en-US" sz="1400" b="0" i="0" dirty="0" err="1">
+              <a:rPr lang="en-US" sz="1200" b="0" i="0" dirty="0" err="1">
                 <a:solidFill>
                   <a:srgbClr val="000000"/>
                 </a:solidFill>
@@ -5141,7 +5170,7 @@
               <a:t>udp</a:t>
             </a:r>
             <a:r>
-              <a:rPr lang="en-US" sz="1400" b="0" i="0" dirty="0">
+              <a:rPr lang="en-US" sz="1200" b="0" i="0" dirty="0">
                 <a:solidFill>
                   <a:srgbClr val="000000"/>
                 </a:solidFill>
@@ -5151,7 +5180,7 @@
               <a:t> </a:t>
             </a:r>
             <a:r>
-              <a:rPr lang="en-US" sz="1400" b="0" i="0" dirty="0" err="1">
+              <a:rPr lang="en-US" sz="1200" b="0" i="0" dirty="0" err="1">
                 <a:solidFill>
                   <a:srgbClr val="000000"/>
                 </a:solidFill>
@@ -5161,7 +5190,7 @@
               <a:t>packts</a:t>
             </a:r>
             <a:r>
-              <a:rPr lang="en-US" sz="1400" b="0" i="0" dirty="0">
+              <a:rPr lang="en-US" sz="1200" b="0" i="0" dirty="0">
                 <a:solidFill>
                   <a:srgbClr val="000000"/>
                 </a:solidFill>
@@ -5171,7 +5200,7 @@
               <a:t> to </a:t>
             </a:r>
             <a:r>
-              <a:rPr lang="en-US" sz="1400" b="0" i="0" dirty="0" err="1">
+              <a:rPr lang="en-US" sz="1200" b="0" i="0" dirty="0" err="1">
                 <a:solidFill>
                   <a:srgbClr val="000000"/>
                 </a:solidFill>
@@ -5181,7 +5210,7 @@
               <a:t>c#</a:t>
             </a:r>
             <a:r>
-              <a:rPr lang="en-US" sz="1400" b="0" i="0" dirty="0">
+              <a:rPr lang="en-US" sz="1200" b="0" i="0" dirty="0">
                 <a:solidFill>
                   <a:srgbClr val="000000"/>
                 </a:solidFill>
@@ -5191,7 +5220,7 @@
               <a:t> clients running which </a:t>
             </a:r>
             <a:r>
-              <a:rPr lang="en-US" sz="1400" b="0" i="0" dirty="0" err="1">
+              <a:rPr lang="en-US" sz="1200" b="0" i="0" dirty="0" err="1">
                 <a:solidFill>
                   <a:srgbClr val="000000"/>
                 </a:solidFill>
@@ -5201,7 +5230,7 @@
               <a:t>c#</a:t>
             </a:r>
             <a:r>
-              <a:rPr lang="en-US" sz="1400" b="0" i="0" dirty="0">
+              <a:rPr lang="en-US" sz="1200" b="0" i="0" dirty="0">
                 <a:solidFill>
                   <a:srgbClr val="000000"/>
                 </a:solidFill>
@@ -5217,7 +5246,7 @@
               <a:buChar char="Þ"/>
             </a:pPr>
             <a:r>
-              <a:rPr lang="en-US" sz="1400" b="0" i="0" dirty="0">
+              <a:rPr lang="en-US" sz="1200" b="0" i="0" dirty="0">
                 <a:solidFill>
                   <a:srgbClr val="000000"/>
                 </a:solidFill>
@@ -5227,7 +5256,7 @@
               <a:t>this means my server </a:t>
             </a:r>
             <a:r>
-              <a:rPr lang="en-US" sz="1400" b="0" i="0" dirty="0" err="1">
+              <a:rPr lang="en-US" sz="1200" b="0" i="0" dirty="0" err="1">
                 <a:solidFill>
                   <a:srgbClr val="000000"/>
                 </a:solidFill>
@@ -5237,7 +5266,7 @@
               <a:t>archintecture</a:t>
             </a:r>
             <a:r>
-              <a:rPr lang="en-US" sz="1400" b="0" i="0" dirty="0">
+              <a:rPr lang="en-US" sz="1200" b="0" i="0" dirty="0">
                 <a:solidFill>
                   <a:srgbClr val="000000"/>
                 </a:solidFill>
@@ -5247,7 +5276,7 @@
               <a:t> is snapshot interpolation rather than state synchronization as the </a:t>
             </a:r>
             <a:r>
-              <a:rPr lang="en-US" sz="1400" b="0" i="0" dirty="0" err="1">
+              <a:rPr lang="en-US" sz="1200" b="0" i="0" dirty="0" err="1">
                 <a:solidFill>
                   <a:srgbClr val="000000"/>
                 </a:solidFill>
@@ -5257,7 +5286,7 @@
               <a:t>c#</a:t>
             </a:r>
             <a:r>
-              <a:rPr lang="en-US" sz="1400" b="0" i="0" dirty="0">
+              <a:rPr lang="en-US" sz="1200" b="0" i="0" dirty="0">
                 <a:solidFill>
                   <a:srgbClr val="000000"/>
                 </a:solidFill>
@@ -5267,7 +5296,7 @@
               <a:t> clients cannot simulate physics without the </a:t>
             </a:r>
             <a:r>
-              <a:rPr lang="en-US" sz="1400" b="0" i="0" dirty="0" err="1">
+              <a:rPr lang="en-US" sz="1200" b="0" i="0" dirty="0" err="1">
                 <a:solidFill>
                   <a:srgbClr val="000000"/>
                 </a:solidFill>
@@ -5277,7 +5306,7 @@
               <a:t>c++</a:t>
             </a:r>
             <a:r>
-              <a:rPr lang="en-US" sz="1400" b="0" i="0" dirty="0">
+              <a:rPr lang="en-US" sz="1200" b="0" i="0" dirty="0">
                 <a:solidFill>
                   <a:srgbClr val="000000"/>
                 </a:solidFill>
@@ -5293,7 +5322,7 @@
               <a:buChar char="Þ"/>
             </a:pPr>
             <a:r>
-              <a:rPr lang="en-US" sz="1400" b="0" i="0" dirty="0">
+              <a:rPr lang="en-US" sz="1200" b="0" i="0" dirty="0">
                 <a:solidFill>
                   <a:srgbClr val="000000"/>
                 </a:solidFill>
@@ -5303,7 +5332,7 @@
               <a:t>the </a:t>
             </a:r>
             <a:r>
-              <a:rPr lang="en-US" sz="1400" b="0" i="0" dirty="0" err="1">
+              <a:rPr lang="en-US" sz="1200" b="0" i="0" dirty="0" err="1">
                 <a:solidFill>
                   <a:srgbClr val="000000"/>
                 </a:solidFill>
@@ -5313,7 +5342,7 @@
               <a:t>c++</a:t>
             </a:r>
             <a:r>
-              <a:rPr lang="en-US" sz="1400" b="0" i="0" dirty="0">
+              <a:rPr lang="en-US" sz="1200" b="0" i="0" dirty="0">
                 <a:solidFill>
                   <a:srgbClr val="000000"/>
                 </a:solidFill>
@@ -5323,7 +5352,7 @@
               <a:t> server and </a:t>
             </a:r>
             <a:r>
-              <a:rPr lang="en-US" sz="1400" b="0" i="0" dirty="0" err="1">
+              <a:rPr lang="en-US" sz="1200" b="0" i="0" dirty="0" err="1">
                 <a:solidFill>
                   <a:srgbClr val="000000"/>
                 </a:solidFill>
@@ -5333,7 +5362,7 @@
               <a:t>gameengine</a:t>
             </a:r>
             <a:r>
-              <a:rPr lang="en-US" sz="1400" b="0" i="0" dirty="0">
+              <a:rPr lang="en-US" sz="1200" b="0" i="0" dirty="0">
                 <a:solidFill>
                   <a:srgbClr val="000000"/>
                 </a:solidFill>
@@ -5343,7 +5372,7 @@
               <a:t> can technically be interfaced with via </a:t>
             </a:r>
             <a:r>
-              <a:rPr lang="en-US" sz="1400" b="0" i="0" dirty="0" err="1">
+              <a:rPr lang="en-US" sz="1200" b="0" i="0" dirty="0" err="1">
                 <a:solidFill>
                   <a:srgbClr val="000000"/>
                 </a:solidFill>
@@ -5353,7 +5382,7 @@
               <a:t>unmannaged</a:t>
             </a:r>
             <a:r>
-              <a:rPr lang="en-US" sz="1400" b="0" i="0" dirty="0">
+              <a:rPr lang="en-US" sz="1200" b="0" i="0" dirty="0">
                 <a:solidFill>
                   <a:srgbClr val="000000"/>
                 </a:solidFill>
@@ -5363,7 +5392,7 @@
               <a:t> </a:t>
             </a:r>
             <a:r>
-              <a:rPr lang="en-US" sz="1400" b="0" i="0" dirty="0" err="1">
+              <a:rPr lang="en-US" sz="1200" b="0" i="0" dirty="0" err="1">
                 <a:solidFill>
                   <a:srgbClr val="000000"/>
                 </a:solidFill>
@@ -5373,7 +5402,7 @@
               <a:t>dll</a:t>
             </a:r>
             <a:r>
-              <a:rPr lang="en-US" sz="1400" b="0" i="0" dirty="0">
+              <a:rPr lang="en-US" sz="1200" b="0" i="0" dirty="0">
                 <a:solidFill>
                   <a:srgbClr val="000000"/>
                 </a:solidFill>
@@ -5383,7 +5412,7 @@
               <a:t> from </a:t>
             </a:r>
             <a:r>
-              <a:rPr lang="en-US" sz="1400" b="0" i="0" dirty="0" err="1">
+              <a:rPr lang="en-US" sz="1200" b="0" i="0" dirty="0" err="1">
                 <a:solidFill>
                   <a:srgbClr val="000000"/>
                 </a:solidFill>
@@ -5393,7 +5422,7 @@
               <a:t>c#</a:t>
             </a:r>
             <a:r>
-              <a:rPr lang="en-US" sz="1400" b="0" i="0" dirty="0">
+              <a:rPr lang="en-US" sz="1200" b="0" i="0" dirty="0">
                 <a:solidFill>
                   <a:srgbClr val="000000"/>
                 </a:solidFill>
@@ -5403,7 +5432,7 @@
               <a:t> but </a:t>
             </a:r>
             <a:r>
-              <a:rPr lang="en-US" sz="1400" b="0" i="0" dirty="0" err="1">
+              <a:rPr lang="en-US" sz="1200" b="0" i="0" dirty="0" err="1">
                 <a:solidFill>
                   <a:srgbClr val="000000"/>
                 </a:solidFill>
@@ -5413,7 +5442,7 @@
               <a:t>i</a:t>
             </a:r>
             <a:r>
-              <a:rPr lang="en-US" sz="1400" b="0" i="0" dirty="0">
+              <a:rPr lang="en-US" sz="1200" b="0" i="0" dirty="0">
                 <a:solidFill>
                   <a:srgbClr val="000000"/>
                 </a:solidFill>
@@ -5423,7 +5452,7 @@
               <a:t> think </a:t>
             </a:r>
             <a:r>
-              <a:rPr lang="en-US" sz="1400" b="0" i="0" dirty="0" err="1">
+              <a:rPr lang="en-US" sz="1200" b="0" i="0" dirty="0" err="1">
                 <a:solidFill>
                   <a:srgbClr val="000000"/>
                 </a:solidFill>
@@ -5433,7 +5462,7 @@
               <a:t>thats</a:t>
             </a:r>
             <a:r>
-              <a:rPr lang="en-US" sz="1400" b="0" i="0" dirty="0">
+              <a:rPr lang="en-US" sz="1200" b="0" i="0" dirty="0">
                 <a:solidFill>
                   <a:srgbClr val="000000"/>
                 </a:solidFill>
@@ -5443,7 +5472,7 @@
               <a:t> not the best option since </a:t>
             </a:r>
             <a:r>
-              <a:rPr lang="en-US" sz="1400" b="0" i="0" dirty="0" err="1">
+              <a:rPr lang="en-US" sz="1200" b="0" i="0" dirty="0" err="1">
                 <a:solidFill>
                   <a:srgbClr val="000000"/>
                 </a:solidFill>
@@ -5453,7 +5482,7 @@
               <a:t>dll</a:t>
             </a:r>
             <a:r>
-              <a:rPr lang="en-US" sz="1400" b="0" i="0" dirty="0">
+              <a:rPr lang="en-US" sz="1200" b="0" i="0" dirty="0">
                 <a:solidFill>
                   <a:srgbClr val="000000"/>
                 </a:solidFill>
@@ -5463,7 +5492,7 @@
               <a:t> and </a:t>
             </a:r>
             <a:r>
-              <a:rPr lang="en-US" sz="1400" b="0" i="0" dirty="0" err="1">
+              <a:rPr lang="en-US" sz="1200" b="0" i="0" dirty="0" err="1">
                 <a:solidFill>
                   <a:srgbClr val="000000"/>
                 </a:solidFill>
@@ -5473,7 +5502,7 @@
               <a:t>c#</a:t>
             </a:r>
             <a:r>
-              <a:rPr lang="en-US" sz="1400" b="0" i="0" dirty="0">
+              <a:rPr lang="en-US" sz="1200" b="0" i="0" dirty="0">
                 <a:solidFill>
                   <a:srgbClr val="000000"/>
                 </a:solidFill>
@@ -5489,7 +5518,7 @@
               <a:buChar char="Þ"/>
             </a:pPr>
             <a:r>
-              <a:rPr lang="en-US" sz="1400" b="0" i="0" dirty="0">
+              <a:rPr lang="en-US" sz="1200" b="0" i="0" dirty="0">
                 <a:solidFill>
                   <a:srgbClr val="000000"/>
                 </a:solidFill>
@@ -5499,7 +5528,7 @@
               <a:t>coding the game engine in </a:t>
             </a:r>
             <a:r>
-              <a:rPr lang="en-US" sz="1400" b="0" i="0" dirty="0" err="1">
+              <a:rPr lang="en-US" sz="1200" b="0" i="0" dirty="0" err="1">
                 <a:solidFill>
                   <a:srgbClr val="000000"/>
                 </a:solidFill>
@@ -5509,7 +5538,7 @@
               <a:t>c#</a:t>
             </a:r>
             <a:r>
-              <a:rPr lang="en-US" sz="1400" b="0" i="0" dirty="0">
+              <a:rPr lang="en-US" sz="1200" b="0" i="0" dirty="0">
                 <a:solidFill>
                   <a:srgbClr val="000000"/>
                 </a:solidFill>
@@ -5525,7 +5554,7 @@
               <a:buChar char="Þ"/>
             </a:pPr>
             <a:r>
-              <a:rPr lang="en-US" sz="1400" b="0" i="0" dirty="0" err="1">
+              <a:rPr lang="en-US" sz="1200" b="0" i="0" dirty="0" err="1">
                 <a:solidFill>
                   <a:srgbClr val="000000"/>
                 </a:solidFill>
@@ -5535,7 +5564,7 @@
               <a:t>directx</a:t>
             </a:r>
             <a:r>
-              <a:rPr lang="en-US" sz="1400" b="0" i="0" dirty="0">
+              <a:rPr lang="en-US" sz="1200" b="0" i="0" dirty="0">
                 <a:solidFill>
                   <a:srgbClr val="000000"/>
                 </a:solidFill>
@@ -5545,7 +5574,7 @@
               <a:t> is </a:t>
             </a:r>
             <a:r>
-              <a:rPr lang="en-US" sz="1400" b="0" i="0" dirty="0" err="1">
+              <a:rPr lang="en-US" sz="1200" b="0" i="0" dirty="0" err="1">
                 <a:solidFill>
                   <a:srgbClr val="000000"/>
                 </a:solidFill>
@@ -5555,7 +5584,7 @@
               <a:t>c++</a:t>
             </a:r>
             <a:r>
-              <a:rPr lang="en-US" sz="1400" b="0" i="0" dirty="0">
+              <a:rPr lang="en-US" sz="1200" b="0" i="0" dirty="0">
                 <a:solidFill>
                   <a:srgbClr val="000000"/>
                 </a:solidFill>
@@ -5565,7 +5594,7 @@
               <a:t> and has </a:t>
             </a:r>
             <a:r>
-              <a:rPr lang="en-US" sz="1400" b="0" i="0" dirty="0" err="1">
+              <a:rPr lang="en-US" sz="1200" b="0" i="0" dirty="0" err="1">
                 <a:solidFill>
                   <a:srgbClr val="000000"/>
                 </a:solidFill>
@@ -5575,7 +5604,7 @@
               <a:t>hlsl</a:t>
             </a:r>
             <a:r>
-              <a:rPr lang="en-US" sz="1400" b="0" i="0" dirty="0">
+              <a:rPr lang="en-US" sz="1200" b="0" i="0" dirty="0">
                 <a:solidFill>
                   <a:srgbClr val="000000"/>
                 </a:solidFill>
@@ -5585,7 +5614,7 @@
               <a:t> support but for cross platform </a:t>
             </a:r>
             <a:r>
-              <a:rPr lang="en-US" sz="1400" b="0" i="0" dirty="0" err="1">
+              <a:rPr lang="en-US" sz="1200" b="0" i="0" dirty="0" err="1">
                 <a:solidFill>
                   <a:srgbClr val="000000"/>
                 </a:solidFill>
@@ -5595,7 +5624,7 @@
               <a:t>i</a:t>
             </a:r>
             <a:r>
-              <a:rPr lang="en-US" sz="1400" b="0" i="0" dirty="0">
+              <a:rPr lang="en-US" sz="1200" b="0" i="0" dirty="0">
                 <a:solidFill>
                   <a:srgbClr val="000000"/>
                 </a:solidFill>
@@ -5605,7 +5634,7 @@
               <a:t> </a:t>
             </a:r>
             <a:r>
-              <a:rPr lang="en-US" sz="1400" b="0" i="0" dirty="0" err="1">
+              <a:rPr lang="en-US" sz="1200" b="0" i="0" dirty="0" err="1">
                 <a:solidFill>
                   <a:srgbClr val="000000"/>
                 </a:solidFill>
@@ -5615,7 +5644,7 @@
               <a:t>gotta</a:t>
             </a:r>
             <a:r>
-              <a:rPr lang="en-US" sz="1400" b="0" i="0" dirty="0">
+              <a:rPr lang="en-US" sz="1200" b="0" i="0" dirty="0">
                 <a:solidFill>
                   <a:srgbClr val="000000"/>
                 </a:solidFill>
@@ -5625,7 +5654,7 @@
               <a:t> figure </a:t>
             </a:r>
             <a:r>
-              <a:rPr lang="en-US" sz="1400" b="0" i="0" dirty="0" err="1">
+              <a:rPr lang="en-US" sz="1200" b="0" i="0" dirty="0" err="1">
                 <a:solidFill>
                   <a:srgbClr val="000000"/>
                 </a:solidFill>
@@ -5635,7 +5664,7 @@
               <a:t>somethin</a:t>
             </a:r>
             <a:r>
-              <a:rPr lang="en-US" sz="1400" b="0" i="0" dirty="0">
+              <a:rPr lang="en-US" sz="1200" b="0" i="0" dirty="0">
                 <a:solidFill>
                   <a:srgbClr val="000000"/>
                 </a:solidFill>
@@ -5646,7 +5675,7 @@
             </a:r>
           </a:p>
           <a:p>
-            <a:endParaRPr lang="en-GB" sz="1400" dirty="0"/>
+            <a:endParaRPr lang="en-GB" sz="1200" dirty="0"/>
           </a:p>
         </p:txBody>
       </p:sp>
@@ -5924,12 +5953,1087 @@
               <a:t>Simply easier to code as clients only have to do conversion instead of server as well</a:t>
             </a:r>
           </a:p>
+          <a:p>
+            <a:pPr marL="342900" indent="-342900">
+              <a:buFont typeface="Symbol" panose="05050102010706020507" pitchFamily="18" charset="2"/>
+              <a:buChar char="Þ"/>
+            </a:pPr>
+            <a:r>
+              <a:rPr lang="en-GB" dirty="0"/>
+              <a:t>Network packets header design</a:t>
+            </a:r>
+          </a:p>
+          <a:p>
+            <a:pPr marL="617220" lvl="1" indent="-342900">
+              <a:buFont typeface="Symbol" panose="05050102010706020507" pitchFamily="18" charset="2"/>
+              <a:buChar char="Þ"/>
+            </a:pPr>
+            <a:r>
+              <a:rPr lang="en-GB" dirty="0"/>
+              <a:t>See Enter the </a:t>
+            </a:r>
+            <a:r>
+              <a:rPr lang="en-GB" dirty="0" err="1"/>
+              <a:t>DeadZone</a:t>
+            </a:r>
+            <a:endParaRPr lang="en-GB" dirty="0"/>
+          </a:p>
         </p:txBody>
       </p:sp>
     </p:spTree>
     <p:extLst>
       <p:ext uri="{BB962C8B-B14F-4D97-AF65-F5344CB8AC3E}">
         <p14:creationId xmlns:p14="http://schemas.microsoft.com/office/powerpoint/2010/main" val="1515742109"/>
+      </p:ext>
+    </p:extLst>
+  </p:cSld>
+  <p:clrMapOvr>
+    <a:masterClrMapping/>
+  </p:clrMapOvr>
+</p:sld>
+</file>
+
+<file path=ppt/slides/slide8.xml><?xml version="1.0" encoding="utf-8"?>
+<p:sld xmlns:a="http://schemas.openxmlformats.org/drawingml/2006/main" xmlns:r="http://schemas.openxmlformats.org/officeDocument/2006/relationships" xmlns:p="http://schemas.openxmlformats.org/presentationml/2006/main">
+  <p:cSld>
+    <p:spTree>
+      <p:nvGrpSpPr>
+        <p:cNvPr id="1" name=""/>
+        <p:cNvGrpSpPr/>
+        <p:nvPr/>
+      </p:nvGrpSpPr>
+      <p:grpSpPr>
+        <a:xfrm>
+          <a:off x="0" y="0"/>
+          <a:ext cx="0" cy="0"/>
+          <a:chOff x="0" y="0"/>
+          <a:chExt cx="0" cy="0"/>
+        </a:xfrm>
+      </p:grpSpPr>
+      <p:sp>
+        <p:nvSpPr>
+          <p:cNvPr id="2" name="Title 1">
+            <a:extLst>
+              <a:ext uri="{FF2B5EF4-FFF2-40B4-BE49-F238E27FC236}">
+                <a16:creationId xmlns:a16="http://schemas.microsoft.com/office/drawing/2014/main" id="{9DE1A314-D25C-4002-9519-85045AB5182D}"/>
+              </a:ext>
+            </a:extLst>
+          </p:cNvPr>
+          <p:cNvSpPr>
+            <a:spLocks noGrp="1"/>
+          </p:cNvSpPr>
+          <p:nvPr>
+            <p:ph type="title"/>
+          </p:nvPr>
+        </p:nvSpPr>
+        <p:spPr/>
+        <p:txBody>
+          <a:bodyPr/>
+          <a:lstStyle/>
+          <a:p>
+            <a:r>
+              <a:rPr lang="en-GB" dirty="0"/>
+              <a:t>Engine (ECS)</a:t>
+            </a:r>
+          </a:p>
+        </p:txBody>
+      </p:sp>
+      <p:sp>
+        <p:nvSpPr>
+          <p:cNvPr id="3" name="Content Placeholder 2">
+            <a:extLst>
+              <a:ext uri="{FF2B5EF4-FFF2-40B4-BE49-F238E27FC236}">
+                <a16:creationId xmlns:a16="http://schemas.microsoft.com/office/drawing/2014/main" id="{0D4BEC63-E738-45B5-8097-5280B098E6B3}"/>
+              </a:ext>
+            </a:extLst>
+          </p:cNvPr>
+          <p:cNvSpPr>
+            <a:spLocks noGrp="1"/>
+          </p:cNvSpPr>
+          <p:nvPr>
+            <p:ph idx="1"/>
+          </p:nvPr>
+        </p:nvSpPr>
+        <p:spPr/>
+        <p:txBody>
+          <a:bodyPr>
+            <a:normAutofit lnSpcReduction="10000"/>
+          </a:bodyPr>
+          <a:lstStyle/>
+          <a:p>
+            <a:pPr marL="342900" indent="-342900">
+              <a:buFont typeface="Symbol" panose="05050102010706020507" pitchFamily="18" charset="2"/>
+              <a:buChar char="Þ"/>
+            </a:pPr>
+            <a:r>
+              <a:rPr lang="en-GB" dirty="0"/>
+              <a:t>Uses ECS Archetype implementation</a:t>
+            </a:r>
+          </a:p>
+          <a:p>
+            <a:pPr marL="617220" lvl="1" indent="-342900">
+              <a:buFont typeface="Symbol" panose="05050102010706020507" pitchFamily="18" charset="2"/>
+              <a:buChar char="Þ"/>
+            </a:pPr>
+            <a:r>
+              <a:rPr lang="en-GB" dirty="0">
+                <a:hlinkClick r:id="rId2"/>
+              </a:rPr>
+              <a:t>https://ajmmertens.medium.com/building-an-ecs-2-archetypes-and-vectorization-fe21690805f9</a:t>
+            </a:r>
+            <a:r>
+              <a:rPr lang="en-GB" dirty="0"/>
+              <a:t> (based on)</a:t>
+            </a:r>
+          </a:p>
+          <a:p>
+            <a:pPr marL="342900" indent="-342900">
+              <a:buFont typeface="Symbol" panose="05050102010706020507" pitchFamily="18" charset="2"/>
+              <a:buChar char="Þ"/>
+            </a:pPr>
+            <a:r>
+              <a:rPr lang="en-GB" dirty="0"/>
+              <a:t>Entity Hierarchy system</a:t>
+            </a:r>
+          </a:p>
+          <a:p>
+            <a:pPr marL="342900" indent="-342900">
+              <a:buFont typeface="Symbol" panose="05050102010706020507" pitchFamily="18" charset="2"/>
+              <a:buChar char="Þ"/>
+            </a:pPr>
+            <a:r>
+              <a:rPr lang="en-GB" dirty="0"/>
+              <a:t>ECS_ID for naming components to make them readable and </a:t>
+            </a:r>
+            <a:r>
+              <a:rPr lang="en-GB" dirty="0" err="1"/>
+              <a:t>debbugable</a:t>
+            </a:r>
+            <a:endParaRPr lang="en-GB" dirty="0"/>
+          </a:p>
+          <a:p>
+            <a:pPr marL="342900" indent="-342900">
+              <a:buFont typeface="Symbol" panose="05050102010706020507" pitchFamily="18" charset="2"/>
+              <a:buChar char="Þ"/>
+            </a:pPr>
+            <a:r>
+              <a:rPr lang="en-GB" dirty="0" err="1"/>
+              <a:t>EntityHandle</a:t>
+            </a:r>
+            <a:r>
+              <a:rPr lang="en-GB" dirty="0"/>
+              <a:t> uses specific bit pattern</a:t>
+            </a:r>
+          </a:p>
+          <a:p>
+            <a:pPr marL="617220" lvl="1" indent="-342900">
+              <a:buFont typeface="Symbol" panose="05050102010706020507" pitchFamily="18" charset="2"/>
+              <a:buChar char="Þ"/>
+            </a:pPr>
+            <a:r>
+              <a:rPr lang="en-GB" dirty="0"/>
+              <a:t>At the moment the last 8 bits specify the type role (</a:t>
+            </a:r>
+            <a:r>
+              <a:rPr lang="en-GB" dirty="0" err="1"/>
+              <a:t>e.g</a:t>
+            </a:r>
+            <a:r>
+              <a:rPr lang="en-GB" dirty="0"/>
+              <a:t> Parent (hierarchy), </a:t>
+            </a:r>
+            <a:r>
+              <a:rPr lang="en-GB" dirty="0" err="1"/>
+              <a:t>Instanceof</a:t>
+            </a:r>
+            <a:r>
+              <a:rPr lang="en-GB" dirty="0"/>
+              <a:t> (prefabs) etc…) when it comes to components</a:t>
+            </a:r>
+          </a:p>
+          <a:p>
+            <a:pPr marL="617220" lvl="1" indent="-342900">
+              <a:buFont typeface="Symbol" panose="05050102010706020507" pitchFamily="18" charset="2"/>
+              <a:buChar char="Þ"/>
+            </a:pPr>
+            <a:r>
+              <a:rPr lang="en-GB" dirty="0"/>
+              <a:t>Generator system as described by link above to prevent reuse of deleted objects</a:t>
+            </a:r>
+          </a:p>
+        </p:txBody>
+      </p:sp>
+      <p:sp>
+        <p:nvSpPr>
+          <p:cNvPr id="5" name="TextBox 4">
+            <a:extLst>
+              <a:ext uri="{FF2B5EF4-FFF2-40B4-BE49-F238E27FC236}">
+                <a16:creationId xmlns:a16="http://schemas.microsoft.com/office/drawing/2014/main" id="{4B991EC2-3A0F-4BF4-BE24-D9B1EF3D518F}"/>
+              </a:ext>
+            </a:extLst>
+          </p:cNvPr>
+          <p:cNvSpPr txBox="1"/>
+          <p:nvPr/>
+        </p:nvSpPr>
+        <p:spPr>
+          <a:xfrm>
+            <a:off x="517870" y="2167755"/>
+            <a:ext cx="6094602" cy="4201150"/>
+          </a:xfrm>
+          <a:prstGeom prst="rect">
+            <a:avLst/>
+          </a:prstGeom>
+          <a:noFill/>
+        </p:spPr>
+        <p:txBody>
+          <a:bodyPr wrap="square">
+            <a:spAutoFit/>
+          </a:bodyPr>
+          <a:lstStyle/>
+          <a:p>
+            <a:r>
+              <a:rPr lang="en-US" sz="300" dirty="0">
+                <a:latin typeface="Consolas" panose="020B0609020204030204" pitchFamily="49" charset="0"/>
+              </a:rPr>
+              <a:t>1111111111111111111111111111111111111111111111111111111111111111</a:t>
+            </a:r>
+          </a:p>
+          <a:p>
+            <a:endParaRPr lang="en-US" sz="300" dirty="0">
+              <a:latin typeface="Consolas" panose="020B0609020204030204" pitchFamily="49" charset="0"/>
+            </a:endParaRPr>
+          </a:p>
+          <a:p>
+            <a:r>
+              <a:rPr lang="en-US" sz="300" dirty="0">
+                <a:latin typeface="Consolas" panose="020B0609020204030204" pitchFamily="49" charset="0"/>
+              </a:rPr>
+              <a:t>Entity Hierarchy =&gt;</a:t>
+            </a:r>
+          </a:p>
+          <a:p>
+            <a:r>
+              <a:rPr lang="en-US" sz="300" dirty="0">
+                <a:latin typeface="Consolas" panose="020B0609020204030204" pitchFamily="49" charset="0"/>
+              </a:rPr>
+              <a:t>{</a:t>
+            </a:r>
+          </a:p>
+          <a:p>
+            <a:endParaRPr lang="en-US" sz="300" dirty="0">
+              <a:latin typeface="Consolas" panose="020B0609020204030204" pitchFamily="49" charset="0"/>
+            </a:endParaRPr>
+          </a:p>
+          <a:p>
+            <a:r>
+              <a:rPr lang="en-US" sz="300" dirty="0">
+                <a:latin typeface="Consolas" panose="020B0609020204030204" pitchFamily="49" charset="0"/>
+              </a:rPr>
+              <a:t>    //BASE REQUIREMENTS</a:t>
+            </a:r>
+          </a:p>
+          <a:p>
+            <a:r>
+              <a:rPr lang="en-US" sz="300" dirty="0">
+                <a:latin typeface="Consolas" panose="020B0609020204030204" pitchFamily="49" charset="0"/>
+              </a:rPr>
+              <a:t>    1 : [1, 2], //DEEP_ECS_COMPONENT</a:t>
+            </a:r>
+          </a:p>
+          <a:p>
+            <a:r>
+              <a:rPr lang="en-US" sz="300" dirty="0">
+                <a:latin typeface="Consolas" panose="020B0609020204030204" pitchFamily="49" charset="0"/>
+              </a:rPr>
+              <a:t>    2 : [1, 2], //DEEP_ECS_ID</a:t>
+            </a:r>
+          </a:p>
+          <a:p>
+            <a:r>
+              <a:rPr lang="en-US" sz="300" dirty="0">
+                <a:latin typeface="Consolas" panose="020B0609020204030204" pitchFamily="49" charset="0"/>
+              </a:rPr>
+              <a:t>    </a:t>
+            </a:r>
+          </a:p>
+          <a:p>
+            <a:r>
+              <a:rPr lang="en-US" sz="300" dirty="0">
+                <a:latin typeface="Consolas" panose="020B0609020204030204" pitchFamily="49" charset="0"/>
+              </a:rPr>
+              <a:t>    3 : [1, 2], //Describes a component</a:t>
+            </a:r>
+          </a:p>
+          <a:p>
+            <a:r>
+              <a:rPr lang="en-US" sz="300" dirty="0">
+                <a:latin typeface="Consolas" panose="020B0609020204030204" pitchFamily="49" charset="0"/>
+              </a:rPr>
+              <a:t>    4 : [2, 3], //Entity that uses component 3</a:t>
+            </a:r>
+          </a:p>
+          <a:p>
+            <a:r>
+              <a:rPr lang="en-US" sz="300" dirty="0">
+                <a:latin typeface="Consolas" panose="020B0609020204030204" pitchFamily="49" charset="0"/>
+              </a:rPr>
+              <a:t>    5 : [2, 3]  //Entity that uses component 3</a:t>
+            </a:r>
+          </a:p>
+          <a:p>
+            <a:endParaRPr lang="en-US" sz="300" dirty="0">
+              <a:latin typeface="Consolas" panose="020B0609020204030204" pitchFamily="49" charset="0"/>
+            </a:endParaRPr>
+          </a:p>
+          <a:p>
+            <a:r>
+              <a:rPr lang="en-US" sz="300" dirty="0">
+                <a:latin typeface="Consolas" panose="020B0609020204030204" pitchFamily="49" charset="0"/>
+              </a:rPr>
+              <a:t>}</a:t>
+            </a:r>
+          </a:p>
+          <a:p>
+            <a:endParaRPr lang="en-US" sz="300" dirty="0">
+              <a:latin typeface="Consolas" panose="020B0609020204030204" pitchFamily="49" charset="0"/>
+            </a:endParaRPr>
+          </a:p>
+          <a:p>
+            <a:r>
+              <a:rPr lang="en-US" sz="300" dirty="0">
+                <a:latin typeface="Consolas" panose="020B0609020204030204" pitchFamily="49" charset="0"/>
+              </a:rPr>
+              <a:t>Archetype Component Listing =&gt;</a:t>
+            </a:r>
+          </a:p>
+          <a:p>
+            <a:r>
+              <a:rPr lang="en-US" sz="300" dirty="0">
+                <a:latin typeface="Consolas" panose="020B0609020204030204" pitchFamily="49" charset="0"/>
+              </a:rPr>
+              <a:t>{</a:t>
+            </a:r>
+          </a:p>
+          <a:p>
+            <a:r>
+              <a:rPr lang="en-US" sz="300" dirty="0">
+                <a:latin typeface="Consolas" panose="020B0609020204030204" pitchFamily="49" charset="0"/>
+              </a:rPr>
+              <a:t>    [1, 2] : [1, 2, 3]</a:t>
+            </a:r>
+          </a:p>
+          <a:p>
+            <a:r>
+              <a:rPr lang="en-US" sz="300" dirty="0">
+                <a:latin typeface="Consolas" panose="020B0609020204030204" pitchFamily="49" charset="0"/>
+              </a:rPr>
+              <a:t>    [2, 3] : [4, 5]</a:t>
+            </a:r>
+          </a:p>
+          <a:p>
+            <a:r>
+              <a:rPr lang="en-US" sz="300" dirty="0">
+                <a:latin typeface="Consolas" panose="020B0609020204030204" pitchFamily="49" charset="0"/>
+              </a:rPr>
+              <a:t>}</a:t>
+            </a:r>
+          </a:p>
+          <a:p>
+            <a:endParaRPr lang="en-US" sz="300" dirty="0">
+              <a:latin typeface="Consolas" panose="020B0609020204030204" pitchFamily="49" charset="0"/>
+            </a:endParaRPr>
+          </a:p>
+          <a:p>
+            <a:r>
+              <a:rPr lang="en-US" sz="300" dirty="0">
+                <a:latin typeface="Consolas" panose="020B0609020204030204" pitchFamily="49" charset="0"/>
+              </a:rPr>
+              <a:t>As you can see here, the hierarchy describes entity and component types, when it comes</a:t>
+            </a:r>
+          </a:p>
+          <a:p>
+            <a:r>
+              <a:rPr lang="en-US" sz="300" dirty="0">
+                <a:latin typeface="Consolas" panose="020B0609020204030204" pitchFamily="49" charset="0"/>
+              </a:rPr>
+              <a:t>to entities owning </a:t>
+            </a:r>
+            <a:r>
+              <a:rPr lang="en-US" sz="300" dirty="0" err="1">
+                <a:latin typeface="Consolas" panose="020B0609020204030204" pitchFamily="49" charset="0"/>
+              </a:rPr>
+              <a:t>components,the</a:t>
+            </a:r>
+            <a:r>
+              <a:rPr lang="en-US" sz="300" dirty="0">
+                <a:latin typeface="Consolas" panose="020B0609020204030204" pitchFamily="49" charset="0"/>
+              </a:rPr>
+              <a:t> </a:t>
+            </a:r>
+            <a:r>
+              <a:rPr lang="en-US" sz="300" dirty="0" err="1">
+                <a:latin typeface="Consolas" panose="020B0609020204030204" pitchFamily="49" charset="0"/>
+              </a:rPr>
+              <a:t>EntityHandle</a:t>
+            </a:r>
+            <a:r>
+              <a:rPr lang="en-US" sz="300" dirty="0">
+                <a:latin typeface="Consolas" panose="020B0609020204030204" pitchFamily="49" charset="0"/>
+              </a:rPr>
+              <a:t> of the entity is used to find the component</a:t>
+            </a:r>
+          </a:p>
+          <a:p>
+            <a:r>
+              <a:rPr lang="en-US" sz="300" dirty="0">
+                <a:latin typeface="Consolas" panose="020B0609020204030204" pitchFamily="49" charset="0"/>
+              </a:rPr>
+              <a:t>in the "Component Listing". In this way, entities have their own components. You may also</a:t>
+            </a:r>
+          </a:p>
+          <a:p>
+            <a:r>
+              <a:rPr lang="en-US" sz="300" dirty="0">
+                <a:latin typeface="Consolas" panose="020B0609020204030204" pitchFamily="49" charset="0"/>
+              </a:rPr>
+              <a:t>notice that Components have Components (as can be seen by component 3 having component 1 </a:t>
+            </a:r>
+          </a:p>
+          <a:p>
+            <a:r>
+              <a:rPr lang="en-US" sz="300" dirty="0">
+                <a:latin typeface="Consolas" panose="020B0609020204030204" pitchFamily="49" charset="0"/>
+              </a:rPr>
+              <a:t>and 2). The disadvantage of this system means that entities cannot share the same component</a:t>
+            </a:r>
+          </a:p>
+          <a:p>
+            <a:r>
+              <a:rPr lang="en-US" sz="300" dirty="0">
+                <a:latin typeface="Consolas" panose="020B0609020204030204" pitchFamily="49" charset="0"/>
+              </a:rPr>
+              <a:t>instance, but this can be implemented using the Type Role system where the last 8 bits of</a:t>
+            </a:r>
+          </a:p>
+          <a:p>
+            <a:r>
+              <a:rPr lang="en-US" sz="300" dirty="0">
+                <a:latin typeface="Consolas" panose="020B0609020204030204" pitchFamily="49" charset="0"/>
+              </a:rPr>
+              <a:t>the </a:t>
+            </a:r>
+            <a:r>
+              <a:rPr lang="en-US" sz="300" dirty="0" err="1">
+                <a:latin typeface="Consolas" panose="020B0609020204030204" pitchFamily="49" charset="0"/>
+              </a:rPr>
+              <a:t>EntityHandle</a:t>
+            </a:r>
+            <a:r>
+              <a:rPr lang="en-US" sz="300" dirty="0">
+                <a:latin typeface="Consolas" panose="020B0609020204030204" pitchFamily="49" charset="0"/>
+              </a:rPr>
+              <a:t> represent a type role such as "INSTANCEOF" etc... (E.G through the use of</a:t>
+            </a:r>
+          </a:p>
+          <a:p>
+            <a:r>
+              <a:rPr lang="en-US" sz="300" dirty="0">
+                <a:latin typeface="Consolas" panose="020B0609020204030204" pitchFamily="49" charset="0"/>
+              </a:rPr>
+              <a:t>"REFERENCEOF").</a:t>
+            </a:r>
+          </a:p>
+          <a:p>
+            <a:endParaRPr lang="en-US" sz="300" dirty="0">
+              <a:latin typeface="Consolas" panose="020B0609020204030204" pitchFamily="49" charset="0"/>
+            </a:endParaRPr>
+          </a:p>
+          <a:p>
+            <a:r>
+              <a:rPr lang="en-US" sz="300" dirty="0">
+                <a:latin typeface="Consolas" panose="020B0609020204030204" pitchFamily="49" charset="0"/>
+              </a:rPr>
+              <a:t>The method described here: https://ajmmertens.medium.com/building-an-ecs-2-archetypes-and-vectorization-fe21690805f9</a:t>
+            </a:r>
+          </a:p>
+          <a:p>
+            <a:r>
+              <a:rPr lang="en-US" sz="300" dirty="0">
+                <a:latin typeface="Consolas" panose="020B0609020204030204" pitchFamily="49" charset="0"/>
+              </a:rPr>
+              <a:t>works fine, and the graph for adding and removing stuff is good, I want to implement that.</a:t>
+            </a:r>
+          </a:p>
+          <a:p>
+            <a:r>
+              <a:rPr lang="en-US" sz="300" dirty="0">
+                <a:latin typeface="Consolas" panose="020B0609020204030204" pitchFamily="49" charset="0"/>
+              </a:rPr>
+              <a:t>However, the struct of arrays approach is indeed very good but with archetypes the non-</a:t>
+            </a:r>
+            <a:r>
+              <a:rPr lang="en-US" sz="300" dirty="0" err="1">
+                <a:latin typeface="Consolas" panose="020B0609020204030204" pitchFamily="49" charset="0"/>
+              </a:rPr>
+              <a:t>interweved</a:t>
+            </a:r>
+            <a:r>
+              <a:rPr lang="en-US" sz="300" dirty="0">
+                <a:latin typeface="Consolas" panose="020B0609020204030204" pitchFamily="49" charset="0"/>
+              </a:rPr>
+              <a:t> memory layout can be a problem:</a:t>
+            </a:r>
+          </a:p>
+          <a:p>
+            <a:r>
+              <a:rPr lang="en-US" sz="300" dirty="0">
+                <a:latin typeface="Consolas" panose="020B0609020204030204" pitchFamily="49" charset="0"/>
+              </a:rPr>
+              <a:t>(https://stackoverflow.com/questions/57560161/what-cpu-cache-does-while-accessing-multiple-arrays)</a:t>
+            </a:r>
+          </a:p>
+          <a:p>
+            <a:r>
+              <a:rPr lang="en-US" sz="300" dirty="0">
+                <a:latin typeface="Consolas" panose="020B0609020204030204" pitchFamily="49" charset="0"/>
+              </a:rPr>
+              <a:t>To solve this I will use the hybrid approach of struct of arrays of structs:</a:t>
+            </a:r>
+          </a:p>
+          <a:p>
+            <a:endParaRPr lang="en-US" sz="300" dirty="0">
+              <a:latin typeface="Consolas" panose="020B0609020204030204" pitchFamily="49" charset="0"/>
+            </a:endParaRPr>
+          </a:p>
+          <a:p>
+            <a:r>
+              <a:rPr lang="en-US" sz="300" dirty="0">
+                <a:latin typeface="Consolas" panose="020B0609020204030204" pitchFamily="49" charset="0"/>
+              </a:rPr>
+              <a:t>struct Container</a:t>
+            </a:r>
+          </a:p>
+          <a:p>
+            <a:r>
+              <a:rPr lang="en-US" sz="300" dirty="0">
+                <a:latin typeface="Consolas" panose="020B0609020204030204" pitchFamily="49" charset="0"/>
+              </a:rPr>
+              <a:t>{</a:t>
+            </a:r>
+          </a:p>
+          <a:p>
+            <a:r>
+              <a:rPr lang="en-US" sz="300" dirty="0">
+                <a:latin typeface="Consolas" panose="020B0609020204030204" pitchFamily="49" charset="0"/>
+              </a:rPr>
+              <a:t>    A[8]</a:t>
+            </a:r>
+          </a:p>
+          <a:p>
+            <a:r>
+              <a:rPr lang="en-US" sz="300" dirty="0">
+                <a:latin typeface="Consolas" panose="020B0609020204030204" pitchFamily="49" charset="0"/>
+              </a:rPr>
+              <a:t>    B[8]</a:t>
+            </a:r>
+          </a:p>
+          <a:p>
+            <a:r>
+              <a:rPr lang="en-US" sz="300" dirty="0">
+                <a:latin typeface="Consolas" panose="020B0609020204030204" pitchFamily="49" charset="0"/>
+              </a:rPr>
+              <a:t>    C[8]</a:t>
+            </a:r>
+          </a:p>
+          <a:p>
+            <a:r>
+              <a:rPr lang="en-US" sz="300" dirty="0">
+                <a:latin typeface="Consolas" panose="020B0609020204030204" pitchFamily="49" charset="0"/>
+              </a:rPr>
+              <a:t>}</a:t>
+            </a:r>
+          </a:p>
+          <a:p>
+            <a:endParaRPr lang="en-US" sz="300" dirty="0">
+              <a:latin typeface="Consolas" panose="020B0609020204030204" pitchFamily="49" charset="0"/>
+            </a:endParaRPr>
+          </a:p>
+          <a:p>
+            <a:r>
+              <a:rPr lang="en-US" sz="300" dirty="0">
+                <a:latin typeface="Consolas" panose="020B0609020204030204" pitchFamily="49" charset="0"/>
+              </a:rPr>
+              <a:t>Container[N]</a:t>
+            </a:r>
+          </a:p>
+          <a:p>
+            <a:endParaRPr lang="en-US" sz="300" dirty="0">
+              <a:latin typeface="Consolas" panose="020B0609020204030204" pitchFamily="49" charset="0"/>
+            </a:endParaRPr>
+          </a:p>
+          <a:p>
+            <a:r>
+              <a:rPr lang="en-US" sz="300" dirty="0">
+                <a:latin typeface="Consolas" panose="020B0609020204030204" pitchFamily="49" charset="0"/>
+              </a:rPr>
+              <a:t>to get the best of both worlds, see : https://stackoverflow.com/questions/40163722/is-my-understanding-of-aos-vs-soa-advantages-disadvantages-correct</a:t>
+            </a:r>
+          </a:p>
+          <a:p>
+            <a:r>
+              <a:rPr lang="en-US" sz="300" dirty="0">
+                <a:latin typeface="Consolas" panose="020B0609020204030204" pitchFamily="49" charset="0"/>
+              </a:rPr>
+              <a:t>and: https://en.wikipedia.org/wiki/AoS_and_SoA#:~:text=Most%20languages%20support%20the%20AoS,support%20a%20data%2Doriented%20design.</a:t>
+            </a:r>
+          </a:p>
+          <a:p>
+            <a:endParaRPr lang="en-US" sz="300" dirty="0">
+              <a:latin typeface="Consolas" panose="020B0609020204030204" pitchFamily="49" charset="0"/>
+            </a:endParaRPr>
+          </a:p>
+          <a:p>
+            <a:r>
+              <a:rPr lang="en-US" sz="300" dirty="0">
+                <a:latin typeface="Consolas" panose="020B0609020204030204" pitchFamily="49" charset="0"/>
+              </a:rPr>
+              <a:t>Another problem to address is the use of vector* causing the actual data of the vectors to be allocated far from each other (</a:t>
+            </a:r>
+            <a:r>
+              <a:rPr lang="en-US" sz="300" dirty="0" err="1">
+                <a:latin typeface="Consolas" panose="020B0609020204030204" pitchFamily="49" charset="0"/>
+              </a:rPr>
+              <a:t>doesnt</a:t>
+            </a:r>
+            <a:r>
+              <a:rPr lang="en-US" sz="300" dirty="0">
+                <a:latin typeface="Consolas" panose="020B0609020204030204" pitchFamily="49" charset="0"/>
+              </a:rPr>
+              <a:t> help with spatial-locality).</a:t>
+            </a:r>
+          </a:p>
+          <a:p>
+            <a:r>
+              <a:rPr lang="en-US" sz="300" dirty="0">
+                <a:latin typeface="Consolas" panose="020B0609020204030204" pitchFamily="49" charset="0"/>
+              </a:rPr>
+              <a:t>I should have archetypes have their components stored locally as shown in the Container example above, and not as:</a:t>
+            </a:r>
+          </a:p>
+          <a:p>
+            <a:endParaRPr lang="en-US" sz="300" dirty="0">
+              <a:latin typeface="Consolas" panose="020B0609020204030204" pitchFamily="49" charset="0"/>
+            </a:endParaRPr>
+          </a:p>
+          <a:p>
+            <a:r>
+              <a:rPr lang="en-US" sz="300" dirty="0">
+                <a:latin typeface="Consolas" panose="020B0609020204030204" pitchFamily="49" charset="0"/>
+              </a:rPr>
+              <a:t>struct Container</a:t>
+            </a:r>
+          </a:p>
+          <a:p>
+            <a:r>
+              <a:rPr lang="en-US" sz="300" dirty="0">
+                <a:latin typeface="Consolas" panose="020B0609020204030204" pitchFamily="49" charset="0"/>
+              </a:rPr>
+              <a:t>{</a:t>
+            </a:r>
+          </a:p>
+          <a:p>
+            <a:r>
+              <a:rPr lang="en-US" sz="300" dirty="0">
+                <a:latin typeface="Consolas" panose="020B0609020204030204" pitchFamily="49" charset="0"/>
+              </a:rPr>
+              <a:t>    std::vector&lt;&gt; A</a:t>
+            </a:r>
+          </a:p>
+          <a:p>
+            <a:r>
+              <a:rPr lang="en-US" sz="300" dirty="0">
+                <a:latin typeface="Consolas" panose="020B0609020204030204" pitchFamily="49" charset="0"/>
+              </a:rPr>
+              <a:t>    std::vector&lt;&gt; B</a:t>
+            </a:r>
+          </a:p>
+          <a:p>
+            <a:r>
+              <a:rPr lang="en-US" sz="300" dirty="0">
+                <a:latin typeface="Consolas" panose="020B0609020204030204" pitchFamily="49" charset="0"/>
+              </a:rPr>
+              <a:t>    std::vector&lt;&gt; C</a:t>
+            </a:r>
+          </a:p>
+          <a:p>
+            <a:r>
+              <a:rPr lang="en-US" sz="300" dirty="0">
+                <a:latin typeface="Consolas" panose="020B0609020204030204" pitchFamily="49" charset="0"/>
+              </a:rPr>
+              <a:t>}</a:t>
+            </a:r>
+          </a:p>
+          <a:p>
+            <a:endParaRPr lang="en-US" sz="300" dirty="0">
+              <a:latin typeface="Consolas" panose="020B0609020204030204" pitchFamily="49" charset="0"/>
+            </a:endParaRPr>
+          </a:p>
+          <a:p>
+            <a:r>
+              <a:rPr lang="en-US" sz="300" dirty="0">
+                <a:latin typeface="Consolas" panose="020B0609020204030204" pitchFamily="49" charset="0"/>
+              </a:rPr>
+              <a:t>This would involve me creating a new container to handle this, and would most likely involve my own implementation using C style arrays.</a:t>
+            </a:r>
+          </a:p>
+          <a:p>
+            <a:endParaRPr lang="en-US" sz="300" dirty="0">
+              <a:latin typeface="Consolas" panose="020B0609020204030204" pitchFamily="49" charset="0"/>
+            </a:endParaRPr>
+          </a:p>
+          <a:p>
+            <a:r>
+              <a:rPr lang="en-US" sz="300" dirty="0">
+                <a:latin typeface="Consolas" panose="020B0609020204030204" pitchFamily="49" charset="0"/>
+              </a:rPr>
+              <a:t>Another issue that isn't mentioned in the example implementation this is based on are sub archetypes.</a:t>
+            </a:r>
+          </a:p>
+          <a:p>
+            <a:r>
+              <a:rPr lang="en-US" sz="300" dirty="0">
+                <a:latin typeface="Consolas" panose="020B0609020204030204" pitchFamily="49" charset="0"/>
+              </a:rPr>
+              <a:t>Say 2 archetypes exist:</a:t>
+            </a:r>
+          </a:p>
+          <a:p>
+            <a:endParaRPr lang="en-US" sz="300" dirty="0">
+              <a:latin typeface="Consolas" panose="020B0609020204030204" pitchFamily="49" charset="0"/>
+            </a:endParaRPr>
+          </a:p>
+          <a:p>
+            <a:r>
+              <a:rPr lang="en-US" sz="300" dirty="0">
+                <a:latin typeface="Consolas" panose="020B0609020204030204" pitchFamily="49" charset="0"/>
+              </a:rPr>
+              <a:t>[1, 2]</a:t>
+            </a:r>
+          </a:p>
+          <a:p>
+            <a:r>
+              <a:rPr lang="en-US" sz="300" dirty="0">
+                <a:latin typeface="Consolas" panose="020B0609020204030204" pitchFamily="49" charset="0"/>
+              </a:rPr>
+              <a:t>[1, 2, 3]</a:t>
+            </a:r>
+          </a:p>
+          <a:p>
+            <a:endParaRPr lang="en-US" sz="300" dirty="0">
+              <a:latin typeface="Consolas" panose="020B0609020204030204" pitchFamily="49" charset="0"/>
+            </a:endParaRPr>
+          </a:p>
+          <a:p>
+            <a:r>
+              <a:rPr lang="en-US" sz="300" dirty="0">
+                <a:latin typeface="Consolas" panose="020B0609020204030204" pitchFamily="49" charset="0"/>
+              </a:rPr>
+              <a:t>Lets say a system iterates over the sub archetype [1, 2], so [1, 2, 3] should also be iterated </a:t>
+            </a:r>
+            <a:r>
+              <a:rPr lang="en-US" sz="300" dirty="0" err="1">
+                <a:latin typeface="Consolas" panose="020B0609020204030204" pitchFamily="49" charset="0"/>
+              </a:rPr>
+              <a:t>over.Cache</a:t>
+            </a:r>
+            <a:r>
+              <a:rPr lang="en-US" sz="300" dirty="0">
+                <a:latin typeface="Consolas" panose="020B0609020204030204" pitchFamily="49" charset="0"/>
+              </a:rPr>
+              <a:t> misses could then </a:t>
+            </a:r>
+            <a:r>
+              <a:rPr lang="en-US" sz="300" dirty="0" err="1">
+                <a:latin typeface="Consolas" panose="020B0609020204030204" pitchFamily="49" charset="0"/>
+              </a:rPr>
+              <a:t>occure</a:t>
+            </a:r>
+            <a:r>
+              <a:rPr lang="en-US" sz="300" dirty="0">
+                <a:latin typeface="Consolas" panose="020B0609020204030204" pitchFamily="49" charset="0"/>
+              </a:rPr>
+              <a:t>.</a:t>
+            </a:r>
+          </a:p>
+          <a:p>
+            <a:r>
+              <a:rPr lang="en-US" sz="300" dirty="0">
+                <a:latin typeface="Consolas" panose="020B0609020204030204" pitchFamily="49" charset="0"/>
+              </a:rPr>
+              <a:t>This can be fixed having copies of components, but then there is the cost of copying values to keep them synchronized. This becomes</a:t>
+            </a:r>
+          </a:p>
+          <a:p>
+            <a:r>
+              <a:rPr lang="en-US" sz="300" dirty="0">
+                <a:latin typeface="Consolas" panose="020B0609020204030204" pitchFamily="49" charset="0"/>
+              </a:rPr>
+              <a:t>worse with:</a:t>
+            </a:r>
+          </a:p>
+          <a:p>
+            <a:endParaRPr lang="en-US" sz="300" dirty="0">
+              <a:latin typeface="Consolas" panose="020B0609020204030204" pitchFamily="49" charset="0"/>
+            </a:endParaRPr>
+          </a:p>
+          <a:p>
+            <a:r>
+              <a:rPr lang="en-US" sz="300" dirty="0">
+                <a:latin typeface="Consolas" panose="020B0609020204030204" pitchFamily="49" charset="0"/>
+              </a:rPr>
+              <a:t>[1, 3]</a:t>
+            </a:r>
+          </a:p>
+          <a:p>
+            <a:r>
+              <a:rPr lang="en-US" sz="300" dirty="0">
+                <a:latin typeface="Consolas" panose="020B0609020204030204" pitchFamily="49" charset="0"/>
+              </a:rPr>
+              <a:t>[1, 2]</a:t>
+            </a:r>
+          </a:p>
+          <a:p>
+            <a:r>
+              <a:rPr lang="en-US" sz="300" dirty="0">
+                <a:latin typeface="Consolas" panose="020B0609020204030204" pitchFamily="49" charset="0"/>
+              </a:rPr>
+              <a:t>[1, 2, 3]</a:t>
+            </a:r>
+          </a:p>
+          <a:p>
+            <a:r>
+              <a:rPr lang="en-US" sz="300" dirty="0">
+                <a:latin typeface="Consolas" panose="020B0609020204030204" pitchFamily="49" charset="0"/>
+              </a:rPr>
+              <a:t>[1, 2, 3, 4]</a:t>
+            </a:r>
+          </a:p>
+          <a:p>
+            <a:endParaRPr lang="en-US" sz="300" dirty="0">
+              <a:latin typeface="Consolas" panose="020B0609020204030204" pitchFamily="49" charset="0"/>
+            </a:endParaRPr>
+          </a:p>
+          <a:p>
+            <a:r>
+              <a:rPr lang="en-US" sz="300" dirty="0" err="1">
+                <a:latin typeface="Consolas" panose="020B0609020204030204" pitchFamily="49" charset="0"/>
+              </a:rPr>
+              <a:t>Thats</a:t>
+            </a:r>
+            <a:r>
+              <a:rPr lang="en-US" sz="300" dirty="0">
+                <a:latin typeface="Consolas" panose="020B0609020204030204" pitchFamily="49" charset="0"/>
+              </a:rPr>
+              <a:t> a lot of </a:t>
+            </a:r>
+            <a:r>
+              <a:rPr lang="en-US" sz="300" dirty="0" err="1">
+                <a:latin typeface="Consolas" panose="020B0609020204030204" pitchFamily="49" charset="0"/>
+              </a:rPr>
+              <a:t>copies.And</a:t>
+            </a:r>
+            <a:r>
+              <a:rPr lang="en-US" sz="300" dirty="0">
+                <a:latin typeface="Consolas" panose="020B0609020204030204" pitchFamily="49" charset="0"/>
+              </a:rPr>
+              <a:t> I </a:t>
+            </a:r>
+            <a:r>
+              <a:rPr lang="en-US" sz="300" dirty="0" err="1">
+                <a:latin typeface="Consolas" panose="020B0609020204030204" pitchFamily="49" charset="0"/>
+              </a:rPr>
+              <a:t>dont</a:t>
+            </a:r>
+            <a:r>
+              <a:rPr lang="en-US" sz="300" dirty="0">
+                <a:latin typeface="Consolas" panose="020B0609020204030204" pitchFamily="49" charset="0"/>
+              </a:rPr>
+              <a:t> think it'll be worth it.</a:t>
+            </a:r>
+          </a:p>
+          <a:p>
+            <a:r>
+              <a:rPr lang="en-US" sz="300" dirty="0">
+                <a:latin typeface="Consolas" panose="020B0609020204030204" pitchFamily="49" charset="0"/>
+              </a:rPr>
+              <a:t>It is best to just have a system operating on [1, 2] to loop through all archetypes that contain [1, 2]. Due to needing to check and perform</a:t>
+            </a:r>
+          </a:p>
+          <a:p>
+            <a:r>
+              <a:rPr lang="en-US" sz="300" dirty="0">
+                <a:latin typeface="Consolas" panose="020B0609020204030204" pitchFamily="49" charset="0"/>
+              </a:rPr>
+              <a:t>these comparisons, the algorithm for "hashing" these archetypes should probably be a </a:t>
+            </a:r>
+            <a:r>
+              <a:rPr lang="en-US" sz="300" dirty="0" err="1">
+                <a:latin typeface="Consolas" panose="020B0609020204030204" pitchFamily="49" charset="0"/>
+              </a:rPr>
+              <a:t>bitset</a:t>
+            </a:r>
+            <a:r>
+              <a:rPr lang="en-US" sz="300" dirty="0">
+                <a:latin typeface="Consolas" panose="020B0609020204030204" pitchFamily="49" charset="0"/>
+              </a:rPr>
+              <a:t> one such that I can simply perform an "or" operation</a:t>
+            </a:r>
+          </a:p>
+          <a:p>
+            <a:r>
+              <a:rPr lang="en-US" sz="300" dirty="0">
+                <a:latin typeface="Consolas" panose="020B0609020204030204" pitchFamily="49" charset="0"/>
+              </a:rPr>
+              <a:t>and "and" bit operation to compare archetypes (much like bit flags).</a:t>
+            </a:r>
+          </a:p>
+          <a:p>
+            <a:endParaRPr lang="en-US" sz="300" dirty="0">
+              <a:latin typeface="Consolas" panose="020B0609020204030204" pitchFamily="49" charset="0"/>
+            </a:endParaRPr>
+          </a:p>
+          <a:p>
+            <a:r>
+              <a:rPr lang="en-US" sz="300" dirty="0">
+                <a:latin typeface="Consolas" panose="020B0609020204030204" pitchFamily="49" charset="0"/>
+              </a:rPr>
+              <a:t>A cache efficient growing array could be abusing pointer casts using:</a:t>
+            </a:r>
+          </a:p>
+          <a:p>
+            <a:endParaRPr lang="en-US" sz="300" dirty="0">
+              <a:latin typeface="Consolas" panose="020B0609020204030204" pitchFamily="49" charset="0"/>
+            </a:endParaRPr>
+          </a:p>
+          <a:p>
+            <a:r>
+              <a:rPr lang="en-US" sz="300" dirty="0">
+                <a:latin typeface="Consolas" panose="020B0609020204030204" pitchFamily="49" charset="0"/>
+              </a:rPr>
+              <a:t>struct Array</a:t>
+            </a:r>
+          </a:p>
+          <a:p>
+            <a:r>
+              <a:rPr lang="en-US" sz="300" dirty="0">
+                <a:latin typeface="Consolas" panose="020B0609020204030204" pitchFamily="49" charset="0"/>
+              </a:rPr>
+              <a:t>{</a:t>
+            </a:r>
+          </a:p>
+          <a:p>
+            <a:r>
+              <a:rPr lang="en-US" sz="300" dirty="0">
+                <a:latin typeface="Consolas" panose="020B0609020204030204" pitchFamily="49" charset="0"/>
+              </a:rPr>
+              <a:t>    int Size;</a:t>
+            </a:r>
+          </a:p>
+          <a:p>
+            <a:r>
+              <a:rPr lang="en-US" sz="300" dirty="0">
+                <a:latin typeface="Consolas" panose="020B0609020204030204" pitchFamily="49" charset="0"/>
+              </a:rPr>
+              <a:t>}</a:t>
+            </a:r>
+          </a:p>
+          <a:p>
+            <a:endParaRPr lang="en-US" sz="300" dirty="0">
+              <a:latin typeface="Consolas" panose="020B0609020204030204" pitchFamily="49" charset="0"/>
+            </a:endParaRPr>
+          </a:p>
+          <a:p>
+            <a:r>
+              <a:rPr lang="en-US" sz="300" dirty="0">
+                <a:latin typeface="Consolas" panose="020B0609020204030204" pitchFamily="49" charset="0"/>
+              </a:rPr>
+              <a:t>then malloc the </a:t>
+            </a:r>
+            <a:r>
+              <a:rPr lang="en-US" sz="300" dirty="0" err="1">
+                <a:latin typeface="Consolas" panose="020B0609020204030204" pitchFamily="49" charset="0"/>
+              </a:rPr>
+              <a:t>sizeof</a:t>
+            </a:r>
+            <a:r>
+              <a:rPr lang="en-US" sz="300" dirty="0">
+                <a:latin typeface="Consolas" panose="020B0609020204030204" pitchFamily="49" charset="0"/>
+              </a:rPr>
+              <a:t>(Array + (number of elements * </a:t>
+            </a:r>
+            <a:r>
+              <a:rPr lang="en-US" sz="300" dirty="0" err="1">
+                <a:latin typeface="Consolas" panose="020B0609020204030204" pitchFamily="49" charset="0"/>
+              </a:rPr>
+              <a:t>sizeof</a:t>
+            </a:r>
+            <a:r>
+              <a:rPr lang="en-US" sz="300" dirty="0">
+                <a:latin typeface="Consolas" panose="020B0609020204030204" pitchFamily="49" charset="0"/>
+              </a:rPr>
+              <a:t>(type))) then use the void*, and then to access elements simply cast to Array* and + </a:t>
+            </a:r>
+            <a:r>
+              <a:rPr lang="en-US" sz="300" dirty="0" err="1">
+                <a:latin typeface="Consolas" panose="020B0609020204030204" pitchFamily="49" charset="0"/>
+              </a:rPr>
+              <a:t>sizeof</a:t>
+            </a:r>
+            <a:r>
+              <a:rPr lang="en-US" sz="300" dirty="0">
+                <a:latin typeface="Consolas" panose="020B0609020204030204" pitchFamily="49" charset="0"/>
+              </a:rPr>
+              <a:t>(Array) </a:t>
+            </a:r>
+          </a:p>
+          <a:p>
+            <a:r>
+              <a:rPr lang="en-US" sz="300" dirty="0">
+                <a:latin typeface="Consolas" panose="020B0609020204030204" pitchFamily="49" charset="0"/>
+              </a:rPr>
+              <a:t>and treat as normal array with []. Need to check how to free such memory </a:t>
+            </a:r>
+            <a:r>
+              <a:rPr lang="en-US" sz="300" dirty="0" err="1">
+                <a:latin typeface="Consolas" panose="020B0609020204030204" pitchFamily="49" charset="0"/>
+              </a:rPr>
+              <a:t>tho</a:t>
+            </a:r>
+            <a:r>
+              <a:rPr lang="en-US" sz="300" dirty="0">
+                <a:latin typeface="Consolas" panose="020B0609020204030204" pitchFamily="49" charset="0"/>
+              </a:rPr>
+              <a:t> (https://stackoverflow.com/questions/2182103/is-it-ok-to-free-void) </a:t>
+            </a:r>
+            <a:r>
+              <a:rPr lang="en-US" sz="300" dirty="0" err="1">
+                <a:latin typeface="Consolas" panose="020B0609020204030204" pitchFamily="49" charset="0"/>
+              </a:rPr>
+              <a:t>aight</a:t>
+            </a:r>
+            <a:r>
+              <a:rPr lang="en-US" sz="300" dirty="0">
+                <a:latin typeface="Consolas" panose="020B0609020204030204" pitchFamily="49" charset="0"/>
+              </a:rPr>
+              <a:t> its all good :D.</a:t>
+            </a:r>
+          </a:p>
+        </p:txBody>
+      </p:sp>
+    </p:spTree>
+    <p:extLst>
+      <p:ext uri="{BB962C8B-B14F-4D97-AF65-F5344CB8AC3E}">
+        <p14:creationId xmlns:p14="http://schemas.microsoft.com/office/powerpoint/2010/main" val="1586652176"/>
       </p:ext>
     </p:extLst>
   </p:cSld>

</xml_diff>

<commit_message>
Fixed allocation of archetypes creating duplicates
</commit_message>
<xml_diff>
--- a/Enter the Deep Devlog.pptx
+++ b/Enter the Deep Devlog.pptx
@@ -6178,7 +6178,7 @@
         <p:spPr>
           <a:xfrm>
             <a:off x="517870" y="2167755"/>
-            <a:ext cx="6094602" cy="4201150"/>
+            <a:ext cx="6094602" cy="4293483"/>
           </a:xfrm>
           <a:prstGeom prst="rect">
             <a:avLst/>
@@ -6195,7 +6195,15 @@
               <a:rPr lang="en-US" sz="300" dirty="0">
                 <a:latin typeface="Consolas" panose="020B0609020204030204" pitchFamily="49" charset="0"/>
               </a:rPr>
-              <a:t>1111111111111111111111111111111111111111111111111111111111111111</a:t>
+              <a:t>Entity Hierarchy =&gt;</a:t>
+            </a:r>
+          </a:p>
+          <a:p>
+            <a:r>
+              <a:rPr lang="en-US" sz="300" dirty="0">
+                <a:latin typeface="Consolas" panose="020B0609020204030204" pitchFamily="49" charset="0"/>
+              </a:rPr>
+              <a:t>{</a:t>
             </a:r>
           </a:p>
           <a:p>
@@ -6208,15 +6216,55 @@
               <a:rPr lang="en-US" sz="300" dirty="0">
                 <a:latin typeface="Consolas" panose="020B0609020204030204" pitchFamily="49" charset="0"/>
               </a:rPr>
-              <a:t>Entity Hierarchy =&gt;</a:t>
-            </a:r>
-          </a:p>
-          <a:p>
-            <a:r>
-              <a:rPr lang="en-US" sz="300" dirty="0">
-                <a:latin typeface="Consolas" panose="020B0609020204030204" pitchFamily="49" charset="0"/>
-              </a:rPr>
-              <a:t>{</a:t>
+              <a:t>    //BASE REQUIREMENTS</a:t>
+            </a:r>
+          </a:p>
+          <a:p>
+            <a:r>
+              <a:rPr lang="en-US" sz="300" dirty="0">
+                <a:latin typeface="Consolas" panose="020B0609020204030204" pitchFamily="49" charset="0"/>
+              </a:rPr>
+              <a:t>    1 : [1, 2], //DEEP_ECS_COMPONENT</a:t>
+            </a:r>
+          </a:p>
+          <a:p>
+            <a:r>
+              <a:rPr lang="en-US" sz="300" dirty="0">
+                <a:latin typeface="Consolas" panose="020B0609020204030204" pitchFamily="49" charset="0"/>
+              </a:rPr>
+              <a:t>    2 : [1, 2], //DEEP_ECS_ID</a:t>
+            </a:r>
+          </a:p>
+          <a:p>
+            <a:r>
+              <a:rPr lang="en-US" sz="300" dirty="0">
+                <a:latin typeface="Consolas" panose="020B0609020204030204" pitchFamily="49" charset="0"/>
+              </a:rPr>
+              <a:t>    </a:t>
+            </a:r>
+          </a:p>
+          <a:p>
+            <a:r>
+              <a:rPr lang="en-US" sz="300" dirty="0">
+                <a:latin typeface="Consolas" panose="020B0609020204030204" pitchFamily="49" charset="0"/>
+              </a:rPr>
+              <a:t>    3 : [1, 2], //Describes a component</a:t>
+            </a:r>
+          </a:p>
+          <a:p>
+            <a:r>
+              <a:rPr lang="en-US" sz="300" dirty="0">
+                <a:latin typeface="Consolas" panose="020B0609020204030204" pitchFamily="49" charset="0"/>
+              </a:rPr>
+              <a:t>    4 : [2, 3], //Entity that uses component 3</a:t>
+            </a:r>
+          </a:p>
+          <a:p>
+            <a:r>
+              <a:rPr lang="en-US" sz="300" dirty="0">
+                <a:latin typeface="Consolas" panose="020B0609020204030204" pitchFamily="49" charset="0"/>
+              </a:rPr>
+              <a:t>    5 : [2, 3]  //Entity that uses component 3</a:t>
             </a:r>
           </a:p>
           <a:p>
@@ -6229,55 +6277,7 @@
               <a:rPr lang="en-US" sz="300" dirty="0">
                 <a:latin typeface="Consolas" panose="020B0609020204030204" pitchFamily="49" charset="0"/>
               </a:rPr>
-              <a:t>    //BASE REQUIREMENTS</a:t>
-            </a:r>
-          </a:p>
-          <a:p>
-            <a:r>
-              <a:rPr lang="en-US" sz="300" dirty="0">
-                <a:latin typeface="Consolas" panose="020B0609020204030204" pitchFamily="49" charset="0"/>
-              </a:rPr>
-              <a:t>    1 : [1, 2], //DEEP_ECS_COMPONENT</a:t>
-            </a:r>
-          </a:p>
-          <a:p>
-            <a:r>
-              <a:rPr lang="en-US" sz="300" dirty="0">
-                <a:latin typeface="Consolas" panose="020B0609020204030204" pitchFamily="49" charset="0"/>
-              </a:rPr>
-              <a:t>    2 : [1, 2], //DEEP_ECS_ID</a:t>
-            </a:r>
-          </a:p>
-          <a:p>
-            <a:r>
-              <a:rPr lang="en-US" sz="300" dirty="0">
-                <a:latin typeface="Consolas" panose="020B0609020204030204" pitchFamily="49" charset="0"/>
-              </a:rPr>
-              <a:t>    </a:t>
-            </a:r>
-          </a:p>
-          <a:p>
-            <a:r>
-              <a:rPr lang="en-US" sz="300" dirty="0">
-                <a:latin typeface="Consolas" panose="020B0609020204030204" pitchFamily="49" charset="0"/>
-              </a:rPr>
-              <a:t>    3 : [1, 2], //Describes a component</a:t>
-            </a:r>
-          </a:p>
-          <a:p>
-            <a:r>
-              <a:rPr lang="en-US" sz="300" dirty="0">
-                <a:latin typeface="Consolas" panose="020B0609020204030204" pitchFamily="49" charset="0"/>
-              </a:rPr>
-              <a:t>    4 : [2, 3], //Entity that uses component 3</a:t>
-            </a:r>
-          </a:p>
-          <a:p>
-            <a:r>
-              <a:rPr lang="en-US" sz="300" dirty="0">
-                <a:latin typeface="Consolas" panose="020B0609020204030204" pitchFamily="49" charset="0"/>
-              </a:rPr>
-              <a:t>    5 : [2, 3]  //Entity that uses component 3</a:t>
+              <a:t>}</a:t>
             </a:r>
           </a:p>
           <a:p>
@@ -6290,6 +6290,38 @@
               <a:rPr lang="en-US" sz="300" dirty="0">
                 <a:latin typeface="Consolas" panose="020B0609020204030204" pitchFamily="49" charset="0"/>
               </a:rPr>
+              <a:t>Archetype Component Listing =&gt;</a:t>
+            </a:r>
+          </a:p>
+          <a:p>
+            <a:r>
+              <a:rPr lang="en-US" sz="300" dirty="0">
+                <a:latin typeface="Consolas" panose="020B0609020204030204" pitchFamily="49" charset="0"/>
+              </a:rPr>
+              <a:t>{</a:t>
+            </a:r>
+          </a:p>
+          <a:p>
+            <a:r>
+              <a:rPr lang="en-US" sz="300" dirty="0">
+                <a:latin typeface="Consolas" panose="020B0609020204030204" pitchFamily="49" charset="0"/>
+              </a:rPr>
+              <a:t>    [1, 2] : [1, 2, 3]</a:t>
+            </a:r>
+          </a:p>
+          <a:p>
+            <a:r>
+              <a:rPr lang="en-US" sz="300" dirty="0">
+                <a:latin typeface="Consolas" panose="020B0609020204030204" pitchFamily="49" charset="0"/>
+              </a:rPr>
+              <a:t>    [2, 3] : [4, 5]</a:t>
+            </a:r>
+          </a:p>
+          <a:p>
+            <a:r>
+              <a:rPr lang="en-US" sz="300" dirty="0">
+                <a:latin typeface="Consolas" panose="020B0609020204030204" pitchFamily="49" charset="0"/>
+              </a:rPr>
               <a:t>}</a:t>
             </a:r>
           </a:p>
@@ -6303,39 +6335,99 @@
               <a:rPr lang="en-US" sz="300" dirty="0">
                 <a:latin typeface="Consolas" panose="020B0609020204030204" pitchFamily="49" charset="0"/>
               </a:rPr>
-              <a:t>Archetype Component Listing =&gt;</a:t>
-            </a:r>
-          </a:p>
-          <a:p>
-            <a:r>
-              <a:rPr lang="en-US" sz="300" dirty="0">
-                <a:latin typeface="Consolas" panose="020B0609020204030204" pitchFamily="49" charset="0"/>
-              </a:rPr>
-              <a:t>{</a:t>
-            </a:r>
-          </a:p>
-          <a:p>
-            <a:r>
-              <a:rPr lang="en-US" sz="300" dirty="0">
-                <a:latin typeface="Consolas" panose="020B0609020204030204" pitchFamily="49" charset="0"/>
-              </a:rPr>
-              <a:t>    [1, 2] : [1, 2, 3]</a:t>
-            </a:r>
-          </a:p>
-          <a:p>
-            <a:r>
-              <a:rPr lang="en-US" sz="300" dirty="0">
-                <a:latin typeface="Consolas" panose="020B0609020204030204" pitchFamily="49" charset="0"/>
-              </a:rPr>
-              <a:t>    [2, 3] : [4, 5]</a:t>
-            </a:r>
-          </a:p>
-          <a:p>
-            <a:r>
-              <a:rPr lang="en-US" sz="300" dirty="0">
-                <a:latin typeface="Consolas" panose="020B0609020204030204" pitchFamily="49" charset="0"/>
-              </a:rPr>
-              <a:t>}</a:t>
+              <a:t>As you can see here, the hierarchy describes entity and component types, when it comes</a:t>
+            </a:r>
+          </a:p>
+          <a:p>
+            <a:r>
+              <a:rPr lang="en-US" sz="300" dirty="0">
+                <a:latin typeface="Consolas" panose="020B0609020204030204" pitchFamily="49" charset="0"/>
+              </a:rPr>
+              <a:t>to entities owning </a:t>
+            </a:r>
+            <a:r>
+              <a:rPr lang="en-US" sz="300" dirty="0" err="1">
+                <a:latin typeface="Consolas" panose="020B0609020204030204" pitchFamily="49" charset="0"/>
+              </a:rPr>
+              <a:t>components,the</a:t>
+            </a:r>
+            <a:r>
+              <a:rPr lang="en-US" sz="300" dirty="0">
+                <a:latin typeface="Consolas" panose="020B0609020204030204" pitchFamily="49" charset="0"/>
+              </a:rPr>
+              <a:t> </a:t>
+            </a:r>
+            <a:r>
+              <a:rPr lang="en-US" sz="300" dirty="0" err="1">
+                <a:latin typeface="Consolas" panose="020B0609020204030204" pitchFamily="49" charset="0"/>
+              </a:rPr>
+              <a:t>EntityHandle</a:t>
+            </a:r>
+            <a:r>
+              <a:rPr lang="en-US" sz="300" dirty="0">
+                <a:latin typeface="Consolas" panose="020B0609020204030204" pitchFamily="49" charset="0"/>
+              </a:rPr>
+              <a:t> of the entity is used to find the component</a:t>
+            </a:r>
+          </a:p>
+          <a:p>
+            <a:r>
+              <a:rPr lang="en-US" sz="300" dirty="0">
+                <a:latin typeface="Consolas" panose="020B0609020204030204" pitchFamily="49" charset="0"/>
+              </a:rPr>
+              <a:t>in the "Component Listing". In this way, entities have their own components. You may also</a:t>
+            </a:r>
+          </a:p>
+          <a:p>
+            <a:r>
+              <a:rPr lang="en-US" sz="300" dirty="0">
+                <a:latin typeface="Consolas" panose="020B0609020204030204" pitchFamily="49" charset="0"/>
+              </a:rPr>
+              <a:t>notice that Components have Components (as can be seen by component 3 having component 1 </a:t>
+            </a:r>
+          </a:p>
+          <a:p>
+            <a:r>
+              <a:rPr lang="en-US" sz="300" dirty="0">
+                <a:latin typeface="Consolas" panose="020B0609020204030204" pitchFamily="49" charset="0"/>
+              </a:rPr>
+              <a:t>and 2). The disadvantage of this system means that entities cannot share the same component</a:t>
+            </a:r>
+          </a:p>
+          <a:p>
+            <a:r>
+              <a:rPr lang="en-US" sz="300" dirty="0">
+                <a:latin typeface="Consolas" panose="020B0609020204030204" pitchFamily="49" charset="0"/>
+              </a:rPr>
+              <a:t>instance, but this can be implemented using the Type Role system where the last 8 bits of</a:t>
+            </a:r>
+          </a:p>
+          <a:p>
+            <a:r>
+              <a:rPr lang="en-US" sz="300" dirty="0">
+                <a:latin typeface="Consolas" panose="020B0609020204030204" pitchFamily="49" charset="0"/>
+              </a:rPr>
+              <a:t>the </a:t>
+            </a:r>
+            <a:r>
+              <a:rPr lang="en-US" sz="300" dirty="0" err="1">
+                <a:latin typeface="Consolas" panose="020B0609020204030204" pitchFamily="49" charset="0"/>
+              </a:rPr>
+              <a:t>EntityHandle</a:t>
+            </a:r>
+            <a:r>
+              <a:rPr lang="en-US" sz="300" dirty="0">
+                <a:latin typeface="Consolas" panose="020B0609020204030204" pitchFamily="49" charset="0"/>
+              </a:rPr>
+              <a:t> represent a type role such as "INSTANCEOF" etc... (E.G through the use of</a:t>
+            </a:r>
+          </a:p>
+          <a:p>
+            <a:r>
+              <a:rPr lang="en-US" sz="300" dirty="0">
+                <a:latin typeface="Consolas" panose="020B0609020204030204" pitchFamily="49" charset="0"/>
+              </a:rPr>
+              <a:t>"REFERENCEOF").</a:t>
             </a:r>
           </a:p>
           <a:p>
@@ -6348,99 +6440,51 @@
               <a:rPr lang="en-US" sz="300" dirty="0">
                 <a:latin typeface="Consolas" panose="020B0609020204030204" pitchFamily="49" charset="0"/>
               </a:rPr>
-              <a:t>As you can see here, the hierarchy describes entity and component types, when it comes</a:t>
-            </a:r>
-          </a:p>
-          <a:p>
-            <a:r>
-              <a:rPr lang="en-US" sz="300" dirty="0">
-                <a:latin typeface="Consolas" panose="020B0609020204030204" pitchFamily="49" charset="0"/>
-              </a:rPr>
-              <a:t>to entities owning </a:t>
+              <a:t>The method described here: https://ajmmertens.medium.com/building-an-ecs-2-archetypes-and-vectorization-fe21690805f9</a:t>
+            </a:r>
+          </a:p>
+          <a:p>
+            <a:r>
+              <a:rPr lang="en-US" sz="300" dirty="0">
+                <a:latin typeface="Consolas" panose="020B0609020204030204" pitchFamily="49" charset="0"/>
+              </a:rPr>
+              <a:t>works fine, and the graph for adding and removing stuff is good, I want to implement that.</a:t>
+            </a:r>
+          </a:p>
+          <a:p>
+            <a:r>
+              <a:rPr lang="en-US" sz="300" dirty="0">
+                <a:latin typeface="Consolas" panose="020B0609020204030204" pitchFamily="49" charset="0"/>
+              </a:rPr>
+              <a:t>However, the struct of arrays approach is indeed very good but with archetypes the non-</a:t>
             </a:r>
             <a:r>
               <a:rPr lang="en-US" sz="300" dirty="0" err="1">
                 <a:latin typeface="Consolas" panose="020B0609020204030204" pitchFamily="49" charset="0"/>
               </a:rPr>
-              <a:t>components,the</a:t>
-            </a:r>
-            <a:r>
-              <a:rPr lang="en-US" sz="300" dirty="0">
-                <a:latin typeface="Consolas" panose="020B0609020204030204" pitchFamily="49" charset="0"/>
-              </a:rPr>
-              <a:t> </a:t>
-            </a:r>
-            <a:r>
-              <a:rPr lang="en-US" sz="300" dirty="0" err="1">
-                <a:latin typeface="Consolas" panose="020B0609020204030204" pitchFamily="49" charset="0"/>
-              </a:rPr>
-              <a:t>EntityHandle</a:t>
-            </a:r>
-            <a:r>
-              <a:rPr lang="en-US" sz="300" dirty="0">
-                <a:latin typeface="Consolas" panose="020B0609020204030204" pitchFamily="49" charset="0"/>
-              </a:rPr>
-              <a:t> of the entity is used to find the component</a:t>
-            </a:r>
-          </a:p>
-          <a:p>
-            <a:r>
-              <a:rPr lang="en-US" sz="300" dirty="0">
-                <a:latin typeface="Consolas" panose="020B0609020204030204" pitchFamily="49" charset="0"/>
-              </a:rPr>
-              <a:t>in the "Component Listing". In this way, entities have their own components. You may also</a:t>
-            </a:r>
-          </a:p>
-          <a:p>
-            <a:r>
-              <a:rPr lang="en-US" sz="300" dirty="0">
-                <a:latin typeface="Consolas" panose="020B0609020204030204" pitchFamily="49" charset="0"/>
-              </a:rPr>
-              <a:t>notice that Components have Components (as can be seen by component 3 having component 1 </a:t>
-            </a:r>
-          </a:p>
-          <a:p>
-            <a:r>
-              <a:rPr lang="en-US" sz="300" dirty="0">
-                <a:latin typeface="Consolas" panose="020B0609020204030204" pitchFamily="49" charset="0"/>
-              </a:rPr>
-              <a:t>and 2). The disadvantage of this system means that entities cannot share the same component</a:t>
-            </a:r>
-          </a:p>
-          <a:p>
-            <a:r>
-              <a:rPr lang="en-US" sz="300" dirty="0">
-                <a:latin typeface="Consolas" panose="020B0609020204030204" pitchFamily="49" charset="0"/>
-              </a:rPr>
-              <a:t>instance, but this can be implemented using the Type Role system where the last 8 bits of</a:t>
-            </a:r>
-          </a:p>
-          <a:p>
-            <a:r>
-              <a:rPr lang="en-US" sz="300" dirty="0">
-                <a:latin typeface="Consolas" panose="020B0609020204030204" pitchFamily="49" charset="0"/>
-              </a:rPr>
-              <a:t>the </a:t>
-            </a:r>
-            <a:r>
-              <a:rPr lang="en-US" sz="300" dirty="0" err="1">
-                <a:latin typeface="Consolas" panose="020B0609020204030204" pitchFamily="49" charset="0"/>
-              </a:rPr>
-              <a:t>EntityHandle</a:t>
-            </a:r>
-            <a:r>
-              <a:rPr lang="en-US" sz="300" dirty="0">
-                <a:latin typeface="Consolas" panose="020B0609020204030204" pitchFamily="49" charset="0"/>
-              </a:rPr>
-              <a:t> represent a type role such as "INSTANCEOF" etc... (E.G through the use of</a:t>
-            </a:r>
-          </a:p>
-          <a:p>
-            <a:r>
-              <a:rPr lang="en-US" sz="300" dirty="0">
-                <a:latin typeface="Consolas" panose="020B0609020204030204" pitchFamily="49" charset="0"/>
-              </a:rPr>
-              <a:t>"REFERENCEOF").</a:t>
+              <a:t>interweved</a:t>
+            </a:r>
+            <a:r>
+              <a:rPr lang="en-US" sz="300" dirty="0">
+                <a:latin typeface="Consolas" panose="020B0609020204030204" pitchFamily="49" charset="0"/>
+              </a:rPr>
+              <a:t> memory layout can be a problem:</a:t>
+            </a:r>
+          </a:p>
+          <a:p>
+            <a:r>
+              <a:rPr lang="en-US" sz="300" dirty="0">
+                <a:latin typeface="Consolas" panose="020B0609020204030204" pitchFamily="49" charset="0"/>
+              </a:rPr>
+              <a:t>(https://stackoverflow.com/questions/57560161/what-cpu-cache-does-while-accessing-multiple-arrays)</a:t>
+            </a:r>
+          </a:p>
+          <a:p>
+            <a:r>
+              <a:rPr lang="en-US" sz="300" dirty="0">
+                <a:latin typeface="Consolas" panose="020B0609020204030204" pitchFamily="49" charset="0"/>
+              </a:rPr>
+              <a:t>To solve this I will use the hybrid approach of struct of arrays of structs:</a:t>
             </a:r>
           </a:p>
           <a:p>
@@ -6453,51 +6497,47 @@
               <a:rPr lang="en-US" sz="300" dirty="0">
                 <a:latin typeface="Consolas" panose="020B0609020204030204" pitchFamily="49" charset="0"/>
               </a:rPr>
-              <a:t>The method described here: https://ajmmertens.medium.com/building-an-ecs-2-archetypes-and-vectorization-fe21690805f9</a:t>
-            </a:r>
-          </a:p>
-          <a:p>
-            <a:r>
-              <a:rPr lang="en-US" sz="300" dirty="0">
-                <a:latin typeface="Consolas" panose="020B0609020204030204" pitchFamily="49" charset="0"/>
-              </a:rPr>
-              <a:t>works fine, and the graph for adding and removing stuff is good, I want to implement that.</a:t>
-            </a:r>
-          </a:p>
-          <a:p>
-            <a:r>
-              <a:rPr lang="en-US" sz="300" dirty="0">
-                <a:latin typeface="Consolas" panose="020B0609020204030204" pitchFamily="49" charset="0"/>
-              </a:rPr>
-              <a:t>However, the struct of arrays approach is indeed very good but with archetypes the non-</a:t>
-            </a:r>
-            <a:r>
-              <a:rPr lang="en-US" sz="300" dirty="0" err="1">
-                <a:latin typeface="Consolas" panose="020B0609020204030204" pitchFamily="49" charset="0"/>
-              </a:rPr>
-              <a:t>interweved</a:t>
-            </a:r>
-            <a:r>
-              <a:rPr lang="en-US" sz="300" dirty="0">
-                <a:latin typeface="Consolas" panose="020B0609020204030204" pitchFamily="49" charset="0"/>
-              </a:rPr>
-              <a:t> memory layout can be a problem:</a:t>
-            </a:r>
-          </a:p>
-          <a:p>
-            <a:r>
-              <a:rPr lang="en-US" sz="300" dirty="0">
-                <a:latin typeface="Consolas" panose="020B0609020204030204" pitchFamily="49" charset="0"/>
-              </a:rPr>
-              <a:t>(https://stackoverflow.com/questions/57560161/what-cpu-cache-does-while-accessing-multiple-arrays)</a:t>
-            </a:r>
-          </a:p>
-          <a:p>
-            <a:r>
-              <a:rPr lang="en-US" sz="300" dirty="0">
-                <a:latin typeface="Consolas" panose="020B0609020204030204" pitchFamily="49" charset="0"/>
-              </a:rPr>
-              <a:t>To solve this I will use the hybrid approach of struct of arrays of structs:</a:t>
+              <a:t>struct Container</a:t>
+            </a:r>
+          </a:p>
+          <a:p>
+            <a:r>
+              <a:rPr lang="en-US" sz="300" dirty="0">
+                <a:latin typeface="Consolas" panose="020B0609020204030204" pitchFamily="49" charset="0"/>
+              </a:rPr>
+              <a:t>{</a:t>
+            </a:r>
+          </a:p>
+          <a:p>
+            <a:r>
+              <a:rPr lang="en-US" sz="300" dirty="0">
+                <a:latin typeface="Consolas" panose="020B0609020204030204" pitchFamily="49" charset="0"/>
+              </a:rPr>
+              <a:t>    A[8]</a:t>
+            </a:r>
+          </a:p>
+          <a:p>
+            <a:r>
+              <a:rPr lang="en-US" sz="300" dirty="0">
+                <a:latin typeface="Consolas" panose="020B0609020204030204" pitchFamily="49" charset="0"/>
+              </a:rPr>
+              <a:t>    B[8]</a:t>
+            </a:r>
+          </a:p>
+          <a:p>
+            <a:r>
+              <a:rPr lang="en-US" sz="300" dirty="0">
+                <a:latin typeface="Consolas" panose="020B0609020204030204" pitchFamily="49" charset="0"/>
+              </a:rPr>
+              <a:t>    C[8]</a:t>
+            </a:r>
+          </a:p>
+          <a:p>
+            <a:r>
+              <a:rPr lang="en-US" sz="300" dirty="0">
+                <a:latin typeface="Consolas" panose="020B0609020204030204" pitchFamily="49" charset="0"/>
+              </a:rPr>
+              <a:t>}</a:t>
             </a:r>
           </a:p>
           <a:p>
@@ -6510,47 +6550,7 @@
               <a:rPr lang="en-US" sz="300" dirty="0">
                 <a:latin typeface="Consolas" panose="020B0609020204030204" pitchFamily="49" charset="0"/>
               </a:rPr>
-              <a:t>struct Container</a:t>
-            </a:r>
-          </a:p>
-          <a:p>
-            <a:r>
-              <a:rPr lang="en-US" sz="300" dirty="0">
-                <a:latin typeface="Consolas" panose="020B0609020204030204" pitchFamily="49" charset="0"/>
-              </a:rPr>
-              <a:t>{</a:t>
-            </a:r>
-          </a:p>
-          <a:p>
-            <a:r>
-              <a:rPr lang="en-US" sz="300" dirty="0">
-                <a:latin typeface="Consolas" panose="020B0609020204030204" pitchFamily="49" charset="0"/>
-              </a:rPr>
-              <a:t>    A[8]</a:t>
-            </a:r>
-          </a:p>
-          <a:p>
-            <a:r>
-              <a:rPr lang="en-US" sz="300" dirty="0">
-                <a:latin typeface="Consolas" panose="020B0609020204030204" pitchFamily="49" charset="0"/>
-              </a:rPr>
-              <a:t>    B[8]</a:t>
-            </a:r>
-          </a:p>
-          <a:p>
-            <a:r>
-              <a:rPr lang="en-US" sz="300" dirty="0">
-                <a:latin typeface="Consolas" panose="020B0609020204030204" pitchFamily="49" charset="0"/>
-              </a:rPr>
-              <a:t>    C[8]</a:t>
-            </a:r>
-          </a:p>
-          <a:p>
-            <a:r>
-              <a:rPr lang="en-US" sz="300" dirty="0">
-                <a:latin typeface="Consolas" panose="020B0609020204030204" pitchFamily="49" charset="0"/>
-              </a:rPr>
-              <a:t>}</a:t>
+              <a:t>I should first profile this in another project</a:t>
             </a:r>
           </a:p>
           <a:p>

</xml_diff>

<commit_message>
Converting CPP server to C99 Server
</commit_message>
<xml_diff>
--- a/Enter the Deep Devlog.pptx
+++ b/Enter the Deep Devlog.pptx
@@ -12,7 +12,8 @@
     <p:sldId id="260" r:id="rId6"/>
     <p:sldId id="261" r:id="rId7"/>
     <p:sldId id="262" r:id="rId8"/>
-    <p:sldId id="263" r:id="rId9"/>
+    <p:sldId id="264" r:id="rId9"/>
+    <p:sldId id="263" r:id="rId10"/>
   </p:sldIdLst>
   <p:sldSz cx="12192000" cy="6858000"/>
   <p:notesSz cx="6858000" cy="9144000"/>
@@ -275,7 +276,7 @@
           <a:p>
             <a:fld id="{5E7AA473-D82F-4EFF-9DF7-AE6D83C51288}" type="datetime1">
               <a:rPr lang="en-US" smtClean="0"/>
-              <a:t>7/4/2021</a:t>
+              <a:t>7/7/2021</a:t>
             </a:fld>
             <a:endParaRPr lang="en-US"/>
           </a:p>
@@ -529,7 +530,7 @@
           <a:p>
             <a:fld id="{1E12F1F0-FE2D-4C1C-B320-8CB9BE735F0F}" type="datetime1">
               <a:rPr lang="en-US" smtClean="0"/>
-              <a:t>7/4/2021</a:t>
+              <a:t>7/7/2021</a:t>
             </a:fld>
             <a:endParaRPr lang="en-US"/>
           </a:p>
@@ -797,7 +798,7 @@
           <a:p>
             <a:fld id="{2CF1B96C-10FD-4EBC-9029-9652B7535D02}" type="datetime1">
               <a:rPr lang="en-US" smtClean="0"/>
-              <a:t>7/4/2021</a:t>
+              <a:t>7/7/2021</a:t>
             </a:fld>
             <a:endParaRPr lang="en-US"/>
           </a:p>
@@ -1051,7 +1052,7 @@
           <a:p>
             <a:fld id="{14878474-CC00-4A95-9D50-A41C12D1EEC4}" type="datetime1">
               <a:rPr lang="en-US" smtClean="0"/>
-              <a:t>7/4/2021</a:t>
+              <a:t>7/7/2021</a:t>
             </a:fld>
             <a:endParaRPr lang="en-US"/>
           </a:p>
@@ -1329,7 +1330,7 @@
           <a:p>
             <a:fld id="{7F38C8B4-7FBB-408F-BDB9-F0496874AFB2}" type="datetime1">
               <a:rPr lang="en-US" smtClean="0"/>
-              <a:t>7/4/2021</a:t>
+              <a:t>7/7/2021</a:t>
             </a:fld>
             <a:endParaRPr lang="en-US"/>
           </a:p>
@@ -1601,7 +1602,7 @@
           <a:p>
             <a:fld id="{2BB8EE20-A5E2-47D3-8F6D-A2BA7AB2E093}" type="datetime1">
               <a:rPr lang="en-US" smtClean="0"/>
-              <a:t>7/4/2021</a:t>
+              <a:t>7/7/2021</a:t>
             </a:fld>
             <a:endParaRPr lang="en-US"/>
           </a:p>
@@ -2159,7 +2160,7 @@
           <a:p>
             <a:fld id="{3382CF99-132F-413F-B7EF-71A5C33F2ED6}" type="datetime1">
               <a:rPr lang="en-US" smtClean="0"/>
-              <a:t>7/4/2021</a:t>
+              <a:t>7/7/2021</a:t>
             </a:fld>
             <a:endParaRPr lang="en-US"/>
           </a:p>
@@ -2301,7 +2302,7 @@
           <a:p>
             <a:fld id="{1F17AE06-98E0-4D9F-A059-92C3548821BB}" type="datetime1">
               <a:rPr lang="en-US" smtClean="0"/>
-              <a:t>7/4/2021</a:t>
+              <a:t>7/7/2021</a:t>
             </a:fld>
             <a:endParaRPr lang="en-US"/>
           </a:p>
@@ -2414,7 +2415,7 @@
           <a:p>
             <a:fld id="{FFBA00CA-3DDC-4705-B840-978EF5EA0707}" type="datetime1">
               <a:rPr lang="en-US" smtClean="0"/>
-              <a:t>7/4/2021</a:t>
+              <a:t>7/7/2021</a:t>
             </a:fld>
             <a:endParaRPr lang="en-US"/>
           </a:p>
@@ -2733,7 +2734,7 @@
           <a:p>
             <a:fld id="{FC366D49-0BBA-4C5A-AD96-6448CA63451A}" type="datetime1">
               <a:rPr lang="en-US" smtClean="0"/>
-              <a:t>7/4/2021</a:t>
+              <a:t>7/7/2021</a:t>
             </a:fld>
             <a:endParaRPr lang="en-US"/>
           </a:p>
@@ -3030,7 +3031,7 @@
           <a:p>
             <a:fld id="{4F4EB293-A316-472D-A8B4-6947CF1A12B7}" type="datetime1">
               <a:rPr lang="en-US" smtClean="0"/>
-              <a:t>7/4/2021</a:t>
+              <a:t>7/7/2021</a:t>
             </a:fld>
             <a:endParaRPr lang="en-US"/>
           </a:p>
@@ -3309,7 +3310,7 @@
           <a:p>
             <a:fld id="{734BCCD4-CEB1-405B-A443-DD9CBCBEA552}" type="datetime1">
               <a:rPr lang="en-US" smtClean="0"/>
-              <a:t>7/4/2021</a:t>
+              <a:t>7/7/2021</a:t>
             </a:fld>
             <a:endParaRPr lang="en-US"/>
           </a:p>
@@ -4943,15 +4944,7 @@
             </a:pPr>
             <a:r>
               <a:rPr lang="en-GB" sz="1200" dirty="0"/>
-              <a:t>A lot more </a:t>
-            </a:r>
-            <a:r>
-              <a:rPr lang="en-GB" sz="1200" dirty="0" err="1"/>
-              <a:t>c++</a:t>
-            </a:r>
-            <a:r>
-              <a:rPr lang="en-GB" sz="1200" dirty="0"/>
-              <a:t> support is given for stuff like game engines</a:t>
+              <a:t>A lot more c support is given for stuff like game engines</a:t>
             </a:r>
           </a:p>
           <a:p>
@@ -4961,7 +4954,7 @@
             </a:pPr>
             <a:r>
               <a:rPr lang="en-GB" sz="1200" dirty="0"/>
-              <a:t>C++</a:t>
+              <a:t>C</a:t>
             </a:r>
           </a:p>
           <a:p>
@@ -5076,7 +5069,48 @@
                 <a:effectLst/>
                 <a:latin typeface="inherit"/>
               </a:rPr>
-              <a:t> can be written in </a:t>
+              <a:t> can be written in c for efficiency and more control</a:t>
+            </a:r>
+          </a:p>
+          <a:p>
+            <a:pPr marL="742950" lvl="1" indent="-285750" fontAlgn="base">
+              <a:buFont typeface="Symbol" panose="05050102010706020507" pitchFamily="18" charset="2"/>
+              <a:buChar char="Þ"/>
+            </a:pPr>
+            <a:r>
+              <a:rPr lang="en-US" sz="1200" dirty="0">
+                <a:solidFill>
+                  <a:srgbClr val="000000"/>
+                </a:solidFill>
+                <a:latin typeface="inherit"/>
+              </a:rPr>
+              <a:t>I</a:t>
+            </a:r>
+            <a:r>
+              <a:rPr lang="en-US" sz="1200" b="0" i="0" dirty="0">
+                <a:solidFill>
+                  <a:srgbClr val="000000"/>
+                </a:solidFill>
+                <a:effectLst/>
+                <a:latin typeface="inherit"/>
+              </a:rPr>
+              <a:t>ll need to learn some addition things to get the server to use the GPU for certain things</a:t>
+            </a:r>
+          </a:p>
+          <a:p>
+            <a:pPr marL="285750" indent="-285750" fontAlgn="base">
+              <a:buFont typeface="Symbol" panose="05050102010706020507" pitchFamily="18" charset="2"/>
+              <a:buChar char="Þ"/>
+            </a:pPr>
+            <a:r>
+              <a:rPr lang="en-US" sz="1200" b="0" i="0" dirty="0">
+                <a:solidFill>
+                  <a:srgbClr val="000000"/>
+                </a:solidFill>
+                <a:effectLst/>
+                <a:latin typeface="inherit"/>
+              </a:rPr>
+              <a:t>the c server can send </a:t>
             </a:r>
             <a:r>
               <a:rPr lang="en-US" sz="1200" b="0" i="0" dirty="0" err="1">
@@ -5086,7 +5120,7 @@
                 <a:effectLst/>
                 <a:latin typeface="inherit"/>
               </a:rPr>
-              <a:t>c++</a:t>
+              <a:t>udp</a:t>
             </a:r>
             <a:r>
               <a:rPr lang="en-US" sz="1200" b="0" i="0" dirty="0">
@@ -5096,22 +5130,17 @@
                 <a:effectLst/>
                 <a:latin typeface="inherit"/>
               </a:rPr>
-              <a:t> for efficiency and more control</a:t>
-            </a:r>
-          </a:p>
-          <a:p>
-            <a:pPr marL="742950" lvl="1" indent="-285750" fontAlgn="base">
-              <a:buFont typeface="Symbol" panose="05050102010706020507" pitchFamily="18" charset="2"/>
-              <a:buChar char="Þ"/>
-            </a:pPr>
-            <a:r>
-              <a:rPr lang="en-US" sz="1200" dirty="0">
+              <a:t> </a:t>
+            </a:r>
+            <a:r>
+              <a:rPr lang="en-US" sz="1200" b="0" i="0" dirty="0" err="1">
                 <a:solidFill>
                   <a:srgbClr val="000000"/>
                 </a:solidFill>
+                <a:effectLst/>
                 <a:latin typeface="inherit"/>
               </a:rPr>
-              <a:t>I</a:t>
+              <a:t>packts</a:t>
             </a:r>
             <a:r>
               <a:rPr lang="en-US" sz="1200" b="0" i="0" dirty="0">
@@ -5121,14 +5150,18 @@
                 <a:effectLst/>
                 <a:latin typeface="inherit"/>
               </a:rPr>
-              <a:t>ll need to learn some addition things to get the server to use the GPU for certain things</a:t>
-            </a:r>
-          </a:p>
-          <a:p>
-            <a:pPr marL="285750" indent="-285750" fontAlgn="base">
-              <a:buFont typeface="Symbol" panose="05050102010706020507" pitchFamily="18" charset="2"/>
-              <a:buChar char="Þ"/>
-            </a:pPr>
+              <a:t> to </a:t>
+            </a:r>
+            <a:r>
+              <a:rPr lang="en-US" sz="1200" b="0" i="0" dirty="0" err="1">
+                <a:solidFill>
+                  <a:srgbClr val="000000"/>
+                </a:solidFill>
+                <a:effectLst/>
+                <a:latin typeface="inherit"/>
+              </a:rPr>
+              <a:t>c#</a:t>
+            </a:r>
             <a:r>
               <a:rPr lang="en-US" sz="1200" b="0" i="0" dirty="0">
                 <a:solidFill>
@@ -5137,7 +5170,7 @@
                 <a:effectLst/>
                 <a:latin typeface="inherit"/>
               </a:rPr>
-              <a:t>the </a:t>
+              <a:t> clients running which </a:t>
             </a:r>
             <a:r>
               <a:rPr lang="en-US" sz="1200" b="0" i="0" dirty="0" err="1">
@@ -5147,7 +5180,7 @@
                 <a:effectLst/>
                 <a:latin typeface="inherit"/>
               </a:rPr>
-              <a:t>c++</a:t>
+              <a:t>c#</a:t>
             </a:r>
             <a:r>
               <a:rPr lang="en-US" sz="1200" b="0" i="0" dirty="0">
@@ -5157,7 +5190,23 @@
                 <a:effectLst/>
                 <a:latin typeface="inherit"/>
               </a:rPr>
-              <a:t> server can send </a:t>
+              <a:t> decodes to render using unity</a:t>
+            </a:r>
+          </a:p>
+          <a:p>
+            <a:pPr marL="285750" indent="-285750" fontAlgn="base">
+              <a:buFont typeface="Symbol" panose="05050102010706020507" pitchFamily="18" charset="2"/>
+              <a:buChar char="Þ"/>
+            </a:pPr>
+            <a:r>
+              <a:rPr lang="en-US" sz="1200" b="0" i="0" dirty="0">
+                <a:solidFill>
+                  <a:srgbClr val="000000"/>
+                </a:solidFill>
+                <a:effectLst/>
+                <a:latin typeface="inherit"/>
+              </a:rPr>
+              <a:t>this means my server </a:t>
             </a:r>
             <a:r>
               <a:rPr lang="en-US" sz="1200" b="0" i="0" dirty="0" err="1">
@@ -5167,7 +5216,7 @@
                 <a:effectLst/>
                 <a:latin typeface="inherit"/>
               </a:rPr>
-              <a:t>udp</a:t>
+              <a:t>archintecture</a:t>
             </a:r>
             <a:r>
               <a:rPr lang="en-US" sz="1200" b="0" i="0" dirty="0">
@@ -5177,7 +5226,7 @@
                 <a:effectLst/>
                 <a:latin typeface="inherit"/>
               </a:rPr>
-              <a:t> </a:t>
+              <a:t> is snapshot interpolation rather than state synchronization as the </a:t>
             </a:r>
             <a:r>
               <a:rPr lang="en-US" sz="1200" b="0" i="0" dirty="0" err="1">
@@ -5187,7 +5236,7 @@
                 <a:effectLst/>
                 <a:latin typeface="inherit"/>
               </a:rPr>
-              <a:t>packts</a:t>
+              <a:t>c#</a:t>
             </a:r>
             <a:r>
               <a:rPr lang="en-US" sz="1200" b="0" i="0" dirty="0">
@@ -5197,7 +5246,23 @@
                 <a:effectLst/>
                 <a:latin typeface="inherit"/>
               </a:rPr>
-              <a:t> to </a:t>
+              <a:t> clients cannot simulate physics without the c game engine</a:t>
+            </a:r>
+          </a:p>
+          <a:p>
+            <a:pPr marL="285750" indent="-285750" fontAlgn="base">
+              <a:buFont typeface="Symbol" panose="05050102010706020507" pitchFamily="18" charset="2"/>
+              <a:buChar char="Þ"/>
+            </a:pPr>
+            <a:r>
+              <a:rPr lang="en-US" sz="1200" b="0" i="0" dirty="0">
+                <a:solidFill>
+                  <a:srgbClr val="000000"/>
+                </a:solidFill>
+                <a:effectLst/>
+                <a:latin typeface="inherit"/>
+              </a:rPr>
+              <a:t>the c server and </a:t>
             </a:r>
             <a:r>
               <a:rPr lang="en-US" sz="1200" b="0" i="0" dirty="0" err="1">
@@ -5207,7 +5272,7 @@
                 <a:effectLst/>
                 <a:latin typeface="inherit"/>
               </a:rPr>
-              <a:t>c#</a:t>
+              <a:t>gameengine</a:t>
             </a:r>
             <a:r>
               <a:rPr lang="en-US" sz="1200" b="0" i="0" dirty="0">
@@ -5217,7 +5282,7 @@
                 <a:effectLst/>
                 <a:latin typeface="inherit"/>
               </a:rPr>
-              <a:t> clients running which </a:t>
+              <a:t> can technically be interfaced with via </a:t>
             </a:r>
             <a:r>
               <a:rPr lang="en-US" sz="1200" b="0" i="0" dirty="0" err="1">
@@ -5227,7 +5292,7 @@
                 <a:effectLst/>
                 <a:latin typeface="inherit"/>
               </a:rPr>
-              <a:t>c#</a:t>
+              <a:t>unmannaged</a:t>
             </a:r>
             <a:r>
               <a:rPr lang="en-US" sz="1200" b="0" i="0" dirty="0">
@@ -5237,14 +5302,18 @@
                 <a:effectLst/>
                 <a:latin typeface="inherit"/>
               </a:rPr>
-              <a:t> decodes to render using unity</a:t>
-            </a:r>
-          </a:p>
-          <a:p>
-            <a:pPr marL="285750" indent="-285750" fontAlgn="base">
-              <a:buFont typeface="Symbol" panose="05050102010706020507" pitchFamily="18" charset="2"/>
-              <a:buChar char="Þ"/>
-            </a:pPr>
+              <a:t> </a:t>
+            </a:r>
+            <a:r>
+              <a:rPr lang="en-US" sz="1200" b="0" i="0" dirty="0" err="1">
+                <a:solidFill>
+                  <a:srgbClr val="000000"/>
+                </a:solidFill>
+                <a:effectLst/>
+                <a:latin typeface="inherit"/>
+              </a:rPr>
+              <a:t>dll</a:t>
+            </a:r>
             <a:r>
               <a:rPr lang="en-US" sz="1200" b="0" i="0" dirty="0">
                 <a:solidFill>
@@ -5253,7 +5322,7 @@
                 <a:effectLst/>
                 <a:latin typeface="inherit"/>
               </a:rPr>
-              <a:t>this means my server </a:t>
+              <a:t> from </a:t>
             </a:r>
             <a:r>
               <a:rPr lang="en-US" sz="1200" b="0" i="0" dirty="0" err="1">
@@ -5263,7 +5332,7 @@
                 <a:effectLst/>
                 <a:latin typeface="inherit"/>
               </a:rPr>
-              <a:t>archintecture</a:t>
+              <a:t>c#</a:t>
             </a:r>
             <a:r>
               <a:rPr lang="en-US" sz="1200" b="0" i="0" dirty="0">
@@ -5273,7 +5342,7 @@
                 <a:effectLst/>
                 <a:latin typeface="inherit"/>
               </a:rPr>
-              <a:t> is snapshot interpolation rather than state synchronization as the </a:t>
+              <a:t> but </a:t>
             </a:r>
             <a:r>
               <a:rPr lang="en-US" sz="1200" b="0" i="0" dirty="0" err="1">
@@ -5283,7 +5352,7 @@
                 <a:effectLst/>
                 <a:latin typeface="inherit"/>
               </a:rPr>
-              <a:t>c#</a:t>
+              <a:t>i</a:t>
             </a:r>
             <a:r>
               <a:rPr lang="en-US" sz="1200" b="0" i="0" dirty="0">
@@ -5293,7 +5362,7 @@
                 <a:effectLst/>
                 <a:latin typeface="inherit"/>
               </a:rPr>
-              <a:t> clients cannot simulate physics without the </a:t>
+              <a:t> think </a:t>
             </a:r>
             <a:r>
               <a:rPr lang="en-US" sz="1200" b="0" i="0" dirty="0" err="1">
@@ -5303,7 +5372,7 @@
                 <a:effectLst/>
                 <a:latin typeface="inherit"/>
               </a:rPr>
-              <a:t>c++</a:t>
+              <a:t>thats</a:t>
             </a:r>
             <a:r>
               <a:rPr lang="en-US" sz="1200" b="0" i="0" dirty="0">
@@ -5313,14 +5382,18 @@
                 <a:effectLst/>
                 <a:latin typeface="inherit"/>
               </a:rPr>
-              <a:t> game engine</a:t>
-            </a:r>
-          </a:p>
-          <a:p>
-            <a:pPr marL="285750" indent="-285750" fontAlgn="base">
-              <a:buFont typeface="Symbol" panose="05050102010706020507" pitchFamily="18" charset="2"/>
-              <a:buChar char="Þ"/>
-            </a:pPr>
+              <a:t> not the best option since </a:t>
+            </a:r>
+            <a:r>
+              <a:rPr lang="en-US" sz="1200" b="0" i="0" dirty="0" err="1">
+                <a:solidFill>
+                  <a:srgbClr val="000000"/>
+                </a:solidFill>
+                <a:effectLst/>
+                <a:latin typeface="inherit"/>
+              </a:rPr>
+              <a:t>dll</a:t>
+            </a:r>
             <a:r>
               <a:rPr lang="en-US" sz="1200" b="0" i="0" dirty="0">
                 <a:solidFill>
@@ -5329,7 +5402,7 @@
                 <a:effectLst/>
                 <a:latin typeface="inherit"/>
               </a:rPr>
-              <a:t>the </a:t>
+              <a:t> and </a:t>
             </a:r>
             <a:r>
               <a:rPr lang="en-US" sz="1200" b="0" i="0" dirty="0" err="1">
@@ -5339,7 +5412,7 @@
                 <a:effectLst/>
                 <a:latin typeface="inherit"/>
               </a:rPr>
-              <a:t>c++</a:t>
+              <a:t>c#</a:t>
             </a:r>
             <a:r>
               <a:rPr lang="en-US" sz="1200" b="0" i="0" dirty="0">
@@ -5349,7 +5422,23 @@
                 <a:effectLst/>
                 <a:latin typeface="inherit"/>
               </a:rPr>
-              <a:t> server and </a:t>
+              <a:t> memory management has bad overhead </a:t>
+            </a:r>
+          </a:p>
+          <a:p>
+            <a:pPr marL="742950" lvl="1" indent="-285750" fontAlgn="base">
+              <a:buFont typeface="Symbol" panose="05050102010706020507" pitchFamily="18" charset="2"/>
+              <a:buChar char="Þ"/>
+            </a:pPr>
+            <a:r>
+              <a:rPr lang="en-US" sz="1200" b="0" i="0" dirty="0">
+                <a:solidFill>
+                  <a:srgbClr val="000000"/>
+                </a:solidFill>
+                <a:effectLst/>
+                <a:latin typeface="inherit"/>
+              </a:rPr>
+              <a:t>coding the game engine in </a:t>
             </a:r>
             <a:r>
               <a:rPr lang="en-US" sz="1200" b="0" i="0" dirty="0" err="1">
@@ -5359,7 +5448,7 @@
                 <a:effectLst/>
                 <a:latin typeface="inherit"/>
               </a:rPr>
-              <a:t>gameengine</a:t>
+              <a:t>c#</a:t>
             </a:r>
             <a:r>
               <a:rPr lang="en-US" sz="1200" b="0" i="0" dirty="0">
@@ -5369,8 +5458,14 @@
                 <a:effectLst/>
                 <a:latin typeface="inherit"/>
               </a:rPr>
-              <a:t> can technically be interfaced with via </a:t>
-            </a:r>
+              <a:t> would solve this issue but the lack of control over the optimization may hurt</a:t>
+            </a:r>
+          </a:p>
+          <a:p>
+            <a:pPr marL="285750" indent="-285750" fontAlgn="base">
+              <a:buFont typeface="Symbol" panose="05050102010706020507" pitchFamily="18" charset="2"/>
+              <a:buChar char="Þ"/>
+            </a:pPr>
             <a:r>
               <a:rPr lang="en-US" sz="1200" b="0" i="0" dirty="0" err="1">
                 <a:solidFill>
@@ -5379,7 +5474,7 @@
                 <a:effectLst/>
                 <a:latin typeface="inherit"/>
               </a:rPr>
-              <a:t>unmannaged</a:t>
+              <a:t>directx</a:t>
             </a:r>
             <a:r>
               <a:rPr lang="en-US" sz="1200" b="0" i="0" dirty="0">
@@ -5389,209 +5484,7 @@
                 <a:effectLst/>
                 <a:latin typeface="inherit"/>
               </a:rPr>
-              <a:t> </a:t>
-            </a:r>
-            <a:r>
-              <a:rPr lang="en-US" sz="1200" b="0" i="0" dirty="0" err="1">
-                <a:solidFill>
-                  <a:srgbClr val="000000"/>
-                </a:solidFill>
-                <a:effectLst/>
-                <a:latin typeface="inherit"/>
-              </a:rPr>
-              <a:t>dll</a:t>
-            </a:r>
-            <a:r>
-              <a:rPr lang="en-US" sz="1200" b="0" i="0" dirty="0">
-                <a:solidFill>
-                  <a:srgbClr val="000000"/>
-                </a:solidFill>
-                <a:effectLst/>
-                <a:latin typeface="inherit"/>
-              </a:rPr>
-              <a:t> from </a:t>
-            </a:r>
-            <a:r>
-              <a:rPr lang="en-US" sz="1200" b="0" i="0" dirty="0" err="1">
-                <a:solidFill>
-                  <a:srgbClr val="000000"/>
-                </a:solidFill>
-                <a:effectLst/>
-                <a:latin typeface="inherit"/>
-              </a:rPr>
-              <a:t>c#</a:t>
-            </a:r>
-            <a:r>
-              <a:rPr lang="en-US" sz="1200" b="0" i="0" dirty="0">
-                <a:solidFill>
-                  <a:srgbClr val="000000"/>
-                </a:solidFill>
-                <a:effectLst/>
-                <a:latin typeface="inherit"/>
-              </a:rPr>
-              <a:t> but </a:t>
-            </a:r>
-            <a:r>
-              <a:rPr lang="en-US" sz="1200" b="0" i="0" dirty="0" err="1">
-                <a:solidFill>
-                  <a:srgbClr val="000000"/>
-                </a:solidFill>
-                <a:effectLst/>
-                <a:latin typeface="inherit"/>
-              </a:rPr>
-              <a:t>i</a:t>
-            </a:r>
-            <a:r>
-              <a:rPr lang="en-US" sz="1200" b="0" i="0" dirty="0">
-                <a:solidFill>
-                  <a:srgbClr val="000000"/>
-                </a:solidFill>
-                <a:effectLst/>
-                <a:latin typeface="inherit"/>
-              </a:rPr>
-              <a:t> think </a:t>
-            </a:r>
-            <a:r>
-              <a:rPr lang="en-US" sz="1200" b="0" i="0" dirty="0" err="1">
-                <a:solidFill>
-                  <a:srgbClr val="000000"/>
-                </a:solidFill>
-                <a:effectLst/>
-                <a:latin typeface="inherit"/>
-              </a:rPr>
-              <a:t>thats</a:t>
-            </a:r>
-            <a:r>
-              <a:rPr lang="en-US" sz="1200" b="0" i="0" dirty="0">
-                <a:solidFill>
-                  <a:srgbClr val="000000"/>
-                </a:solidFill>
-                <a:effectLst/>
-                <a:latin typeface="inherit"/>
-              </a:rPr>
-              <a:t> not the best option since </a:t>
-            </a:r>
-            <a:r>
-              <a:rPr lang="en-US" sz="1200" b="0" i="0" dirty="0" err="1">
-                <a:solidFill>
-                  <a:srgbClr val="000000"/>
-                </a:solidFill>
-                <a:effectLst/>
-                <a:latin typeface="inherit"/>
-              </a:rPr>
-              <a:t>dll</a:t>
-            </a:r>
-            <a:r>
-              <a:rPr lang="en-US" sz="1200" b="0" i="0" dirty="0">
-                <a:solidFill>
-                  <a:srgbClr val="000000"/>
-                </a:solidFill>
-                <a:effectLst/>
-                <a:latin typeface="inherit"/>
-              </a:rPr>
-              <a:t> and </a:t>
-            </a:r>
-            <a:r>
-              <a:rPr lang="en-US" sz="1200" b="0" i="0" dirty="0" err="1">
-                <a:solidFill>
-                  <a:srgbClr val="000000"/>
-                </a:solidFill>
-                <a:effectLst/>
-                <a:latin typeface="inherit"/>
-              </a:rPr>
-              <a:t>c#</a:t>
-            </a:r>
-            <a:r>
-              <a:rPr lang="en-US" sz="1200" b="0" i="0" dirty="0">
-                <a:solidFill>
-                  <a:srgbClr val="000000"/>
-                </a:solidFill>
-                <a:effectLst/>
-                <a:latin typeface="inherit"/>
-              </a:rPr>
-              <a:t> memory management has bad overhead </a:t>
-            </a:r>
-          </a:p>
-          <a:p>
-            <a:pPr marL="742950" lvl="1" indent="-285750" fontAlgn="base">
-              <a:buFont typeface="Symbol" panose="05050102010706020507" pitchFamily="18" charset="2"/>
-              <a:buChar char="Þ"/>
-            </a:pPr>
-            <a:r>
-              <a:rPr lang="en-US" sz="1200" b="0" i="0" dirty="0">
-                <a:solidFill>
-                  <a:srgbClr val="000000"/>
-                </a:solidFill>
-                <a:effectLst/>
-                <a:latin typeface="inherit"/>
-              </a:rPr>
-              <a:t>coding the game engine in </a:t>
-            </a:r>
-            <a:r>
-              <a:rPr lang="en-US" sz="1200" b="0" i="0" dirty="0" err="1">
-                <a:solidFill>
-                  <a:srgbClr val="000000"/>
-                </a:solidFill>
-                <a:effectLst/>
-                <a:latin typeface="inherit"/>
-              </a:rPr>
-              <a:t>c#</a:t>
-            </a:r>
-            <a:r>
-              <a:rPr lang="en-US" sz="1200" b="0" i="0" dirty="0">
-                <a:solidFill>
-                  <a:srgbClr val="000000"/>
-                </a:solidFill>
-                <a:effectLst/>
-                <a:latin typeface="inherit"/>
-              </a:rPr>
-              <a:t> would solve this issue but the lack of control over the optimization may hurt</a:t>
-            </a:r>
-          </a:p>
-          <a:p>
-            <a:pPr marL="285750" indent="-285750" fontAlgn="base">
-              <a:buFont typeface="Symbol" panose="05050102010706020507" pitchFamily="18" charset="2"/>
-              <a:buChar char="Þ"/>
-            </a:pPr>
-            <a:r>
-              <a:rPr lang="en-US" sz="1200" b="0" i="0" dirty="0" err="1">
-                <a:solidFill>
-                  <a:srgbClr val="000000"/>
-                </a:solidFill>
-                <a:effectLst/>
-                <a:latin typeface="inherit"/>
-              </a:rPr>
-              <a:t>directx</a:t>
-            </a:r>
-            <a:r>
-              <a:rPr lang="en-US" sz="1200" b="0" i="0" dirty="0">
-                <a:solidFill>
-                  <a:srgbClr val="000000"/>
-                </a:solidFill>
-                <a:effectLst/>
-                <a:latin typeface="inherit"/>
-              </a:rPr>
-              <a:t> is </a:t>
-            </a:r>
-            <a:r>
-              <a:rPr lang="en-US" sz="1200" b="0" i="0" dirty="0" err="1">
-                <a:solidFill>
-                  <a:srgbClr val="000000"/>
-                </a:solidFill>
-                <a:effectLst/>
-                <a:latin typeface="inherit"/>
-              </a:rPr>
-              <a:t>c++</a:t>
-            </a:r>
-            <a:r>
-              <a:rPr lang="en-US" sz="1200" b="0" i="0" dirty="0">
-                <a:solidFill>
-                  <a:srgbClr val="000000"/>
-                </a:solidFill>
-                <a:effectLst/>
-                <a:latin typeface="inherit"/>
-              </a:rPr>
-              <a:t> and has </a:t>
+              <a:t> is c and has </a:t>
             </a:r>
             <a:r>
               <a:rPr lang="en-US" sz="1200" b="0" i="0" dirty="0" err="1">
@@ -5994,6 +5887,114 @@
 </file>
 
 <file path=ppt/slides/slide8.xml><?xml version="1.0" encoding="utf-8"?>
+<p:sld xmlns:a="http://schemas.openxmlformats.org/drawingml/2006/main" xmlns:r="http://schemas.openxmlformats.org/officeDocument/2006/relationships" xmlns:p="http://schemas.openxmlformats.org/presentationml/2006/main">
+  <p:cSld>
+    <p:spTree>
+      <p:nvGrpSpPr>
+        <p:cNvPr id="1" name=""/>
+        <p:cNvGrpSpPr/>
+        <p:nvPr/>
+      </p:nvGrpSpPr>
+      <p:grpSpPr>
+        <a:xfrm>
+          <a:off x="0" y="0"/>
+          <a:ext cx="0" cy="0"/>
+          <a:chOff x="0" y="0"/>
+          <a:chExt cx="0" cy="0"/>
+        </a:xfrm>
+      </p:grpSpPr>
+      <p:sp>
+        <p:nvSpPr>
+          <p:cNvPr id="2" name="Title 1">
+            <a:extLst>
+              <a:ext uri="{FF2B5EF4-FFF2-40B4-BE49-F238E27FC236}">
+                <a16:creationId xmlns:a16="http://schemas.microsoft.com/office/drawing/2014/main" id="{9BBFAD49-9541-4E16-8171-335F833CCF75}"/>
+              </a:ext>
+            </a:extLst>
+          </p:cNvPr>
+          <p:cNvSpPr>
+            <a:spLocks noGrp="1"/>
+          </p:cNvSpPr>
+          <p:nvPr>
+            <p:ph type="title"/>
+          </p:nvPr>
+        </p:nvSpPr>
+        <p:spPr/>
+        <p:txBody>
+          <a:bodyPr/>
+          <a:lstStyle/>
+          <a:p>
+            <a:r>
+              <a:rPr lang="en-GB" dirty="0"/>
+              <a:t>C - Containers</a:t>
+            </a:r>
+          </a:p>
+        </p:txBody>
+      </p:sp>
+      <p:sp>
+        <p:nvSpPr>
+          <p:cNvPr id="3" name="Content Placeholder 2">
+            <a:extLst>
+              <a:ext uri="{FF2B5EF4-FFF2-40B4-BE49-F238E27FC236}">
+                <a16:creationId xmlns:a16="http://schemas.microsoft.com/office/drawing/2014/main" id="{F8291DBC-9439-4A17-9B1D-C2FF6FA8AF84}"/>
+              </a:ext>
+            </a:extLst>
+          </p:cNvPr>
+          <p:cNvSpPr>
+            <a:spLocks noGrp="1"/>
+          </p:cNvSpPr>
+          <p:nvPr>
+            <p:ph idx="1"/>
+          </p:nvPr>
+        </p:nvSpPr>
+        <p:spPr/>
+        <p:txBody>
+          <a:bodyPr>
+            <a:normAutofit/>
+          </a:bodyPr>
+          <a:lstStyle/>
+          <a:p>
+            <a:pPr marL="342900" indent="-342900">
+              <a:buFont typeface="Symbol" panose="05050102010706020507" pitchFamily="18" charset="2"/>
+              <a:buChar char="Þ"/>
+            </a:pPr>
+            <a:r>
+              <a:rPr lang="en-GB" dirty="0"/>
+              <a:t>Problems with scaling arrays is that </a:t>
+            </a:r>
+            <a:r>
+              <a:rPr lang="en-GB" dirty="0" err="1"/>
+              <a:t>realloc</a:t>
+            </a:r>
+            <a:r>
+              <a:rPr lang="en-GB" dirty="0"/>
+              <a:t> does not invoke copy constructors and also copy constructors don’t exist in C, make it such that you can use a variation of a container if the </a:t>
+            </a:r>
+            <a:r>
+              <a:rPr lang="en-GB" dirty="0" err="1"/>
+              <a:t>ECSHandle</a:t>
+            </a:r>
+            <a:r>
+              <a:rPr lang="en-GB" dirty="0"/>
+              <a:t> for a component flag says the component is not copy safe (requires user-defined copy constructor)</a:t>
+            </a:r>
+          </a:p>
+        </p:txBody>
+      </p:sp>
+    </p:spTree>
+    <p:extLst>
+      <p:ext uri="{BB962C8B-B14F-4D97-AF65-F5344CB8AC3E}">
+        <p14:creationId xmlns:p14="http://schemas.microsoft.com/office/powerpoint/2010/main" val="1221620684"/>
+      </p:ext>
+    </p:extLst>
+  </p:cSld>
+  <p:clrMapOvr>
+    <a:masterClrMapping/>
+  </p:clrMapOvr>
+</p:sld>
+</file>
+
+<file path=ppt/slides/slide9.xml><?xml version="1.0" encoding="utf-8"?>
 <p:sld xmlns:a="http://schemas.openxmlformats.org/drawingml/2006/main" xmlns:r="http://schemas.openxmlformats.org/officeDocument/2006/relationships" xmlns:p="http://schemas.openxmlformats.org/presentationml/2006/main">
   <p:cSld>
     <p:spTree>

</xml_diff>

<commit_message>
Basic implementation of dynamic array
Need to check pointer casting standards and be careful of type punning, strict aliasing and alignment.
</commit_message>
<xml_diff>
--- a/Enter the Deep Devlog.pptx
+++ b/Enter the Deep Devlog.pptx
@@ -276,7 +276,7 @@
           <a:p>
             <a:fld id="{5E7AA473-D82F-4EFF-9DF7-AE6D83C51288}" type="datetime1">
               <a:rPr lang="en-US" smtClean="0"/>
-              <a:t>7/7/2021</a:t>
+              <a:t>7/8/2021</a:t>
             </a:fld>
             <a:endParaRPr lang="en-US"/>
           </a:p>
@@ -530,7 +530,7 @@
           <a:p>
             <a:fld id="{1E12F1F0-FE2D-4C1C-B320-8CB9BE735F0F}" type="datetime1">
               <a:rPr lang="en-US" smtClean="0"/>
-              <a:t>7/7/2021</a:t>
+              <a:t>7/8/2021</a:t>
             </a:fld>
             <a:endParaRPr lang="en-US"/>
           </a:p>
@@ -798,7 +798,7 @@
           <a:p>
             <a:fld id="{2CF1B96C-10FD-4EBC-9029-9652B7535D02}" type="datetime1">
               <a:rPr lang="en-US" smtClean="0"/>
-              <a:t>7/7/2021</a:t>
+              <a:t>7/8/2021</a:t>
             </a:fld>
             <a:endParaRPr lang="en-US"/>
           </a:p>
@@ -1052,7 +1052,7 @@
           <a:p>
             <a:fld id="{14878474-CC00-4A95-9D50-A41C12D1EEC4}" type="datetime1">
               <a:rPr lang="en-US" smtClean="0"/>
-              <a:t>7/7/2021</a:t>
+              <a:t>7/8/2021</a:t>
             </a:fld>
             <a:endParaRPr lang="en-US"/>
           </a:p>
@@ -1330,7 +1330,7 @@
           <a:p>
             <a:fld id="{7F38C8B4-7FBB-408F-BDB9-F0496874AFB2}" type="datetime1">
               <a:rPr lang="en-US" smtClean="0"/>
-              <a:t>7/7/2021</a:t>
+              <a:t>7/8/2021</a:t>
             </a:fld>
             <a:endParaRPr lang="en-US"/>
           </a:p>
@@ -1602,7 +1602,7 @@
           <a:p>
             <a:fld id="{2BB8EE20-A5E2-47D3-8F6D-A2BA7AB2E093}" type="datetime1">
               <a:rPr lang="en-US" smtClean="0"/>
-              <a:t>7/7/2021</a:t>
+              <a:t>7/8/2021</a:t>
             </a:fld>
             <a:endParaRPr lang="en-US"/>
           </a:p>
@@ -2160,7 +2160,7 @@
           <a:p>
             <a:fld id="{3382CF99-132F-413F-B7EF-71A5C33F2ED6}" type="datetime1">
               <a:rPr lang="en-US" smtClean="0"/>
-              <a:t>7/7/2021</a:t>
+              <a:t>7/8/2021</a:t>
             </a:fld>
             <a:endParaRPr lang="en-US"/>
           </a:p>
@@ -2302,7 +2302,7 @@
           <a:p>
             <a:fld id="{1F17AE06-98E0-4D9F-A059-92C3548821BB}" type="datetime1">
               <a:rPr lang="en-US" smtClean="0"/>
-              <a:t>7/7/2021</a:t>
+              <a:t>7/8/2021</a:t>
             </a:fld>
             <a:endParaRPr lang="en-US"/>
           </a:p>
@@ -2415,7 +2415,7 @@
           <a:p>
             <a:fld id="{FFBA00CA-3DDC-4705-B840-978EF5EA0707}" type="datetime1">
               <a:rPr lang="en-US" smtClean="0"/>
-              <a:t>7/7/2021</a:t>
+              <a:t>7/8/2021</a:t>
             </a:fld>
             <a:endParaRPr lang="en-US"/>
           </a:p>
@@ -2734,7 +2734,7 @@
           <a:p>
             <a:fld id="{FC366D49-0BBA-4C5A-AD96-6448CA63451A}" type="datetime1">
               <a:rPr lang="en-US" smtClean="0"/>
-              <a:t>7/7/2021</a:t>
+              <a:t>7/8/2021</a:t>
             </a:fld>
             <a:endParaRPr lang="en-US"/>
           </a:p>
@@ -3031,7 +3031,7 @@
           <a:p>
             <a:fld id="{4F4EB293-A316-472D-A8B4-6947CF1A12B7}" type="datetime1">
               <a:rPr lang="en-US" smtClean="0"/>
-              <a:t>7/7/2021</a:t>
+              <a:t>7/8/2021</a:t>
             </a:fld>
             <a:endParaRPr lang="en-US"/>
           </a:p>
@@ -3310,7 +3310,7 @@
           <a:p>
             <a:fld id="{734BCCD4-CEB1-405B-A443-DD9CBCBEA552}" type="datetime1">
               <a:rPr lang="en-US" smtClean="0"/>
-              <a:t>7/7/2021</a:t>
+              <a:t>7/8/2021</a:t>
             </a:fld>
             <a:endParaRPr lang="en-US"/>
           </a:p>
@@ -5981,6 +5981,36 @@
           </a:p>
         </p:txBody>
       </p:sp>
+      <p:pic>
+        <p:nvPicPr>
+          <p:cNvPr id="5" name="Picture 4">
+            <a:extLst>
+              <a:ext uri="{FF2B5EF4-FFF2-40B4-BE49-F238E27FC236}">
+                <a16:creationId xmlns:a16="http://schemas.microsoft.com/office/drawing/2014/main" id="{19F65FB9-15D8-4833-A245-3B7499ECD4D9}"/>
+              </a:ext>
+            </a:extLst>
+          </p:cNvPr>
+          <p:cNvPicPr>
+            <a:picLocks noChangeAspect="1"/>
+          </p:cNvPicPr>
+          <p:nvPr/>
+        </p:nvPicPr>
+        <p:blipFill>
+          <a:blip r:embed="rId2"/>
+          <a:stretch>
+            <a:fillRect/>
+          </a:stretch>
+        </p:blipFill>
+        <p:spPr>
+          <a:xfrm>
+            <a:off x="508650" y="2216774"/>
+            <a:ext cx="6004882" cy="3662818"/>
+          </a:xfrm>
+          <a:prstGeom prst="rect">
+            <a:avLst/>
+          </a:prstGeom>
+        </p:spPr>
+      </p:pic>
     </p:spTree>
     <p:extLst>
       <p:ext uri="{BB962C8B-B14F-4D97-AF65-F5344CB8AC3E}">

</xml_diff>

<commit_message>
Implemented popping data from dynamic array and cleaned up some code.
</commit_message>
<xml_diff>
--- a/Enter the Deep Devlog.pptx
+++ b/Enter the Deep Devlog.pptx
@@ -276,7 +276,7 @@
           <a:p>
             <a:fld id="{5E7AA473-D82F-4EFF-9DF7-AE6D83C51288}" type="datetime1">
               <a:rPr lang="en-US" smtClean="0"/>
-              <a:t>7/8/2021</a:t>
+              <a:t>7/9/2021</a:t>
             </a:fld>
             <a:endParaRPr lang="en-US"/>
           </a:p>
@@ -530,7 +530,7 @@
           <a:p>
             <a:fld id="{1E12F1F0-FE2D-4C1C-B320-8CB9BE735F0F}" type="datetime1">
               <a:rPr lang="en-US" smtClean="0"/>
-              <a:t>7/8/2021</a:t>
+              <a:t>7/9/2021</a:t>
             </a:fld>
             <a:endParaRPr lang="en-US"/>
           </a:p>
@@ -798,7 +798,7 @@
           <a:p>
             <a:fld id="{2CF1B96C-10FD-4EBC-9029-9652B7535D02}" type="datetime1">
               <a:rPr lang="en-US" smtClean="0"/>
-              <a:t>7/8/2021</a:t>
+              <a:t>7/9/2021</a:t>
             </a:fld>
             <a:endParaRPr lang="en-US"/>
           </a:p>
@@ -1052,7 +1052,7 @@
           <a:p>
             <a:fld id="{14878474-CC00-4A95-9D50-A41C12D1EEC4}" type="datetime1">
               <a:rPr lang="en-US" smtClean="0"/>
-              <a:t>7/8/2021</a:t>
+              <a:t>7/9/2021</a:t>
             </a:fld>
             <a:endParaRPr lang="en-US"/>
           </a:p>
@@ -1330,7 +1330,7 @@
           <a:p>
             <a:fld id="{7F38C8B4-7FBB-408F-BDB9-F0496874AFB2}" type="datetime1">
               <a:rPr lang="en-US" smtClean="0"/>
-              <a:t>7/8/2021</a:t>
+              <a:t>7/9/2021</a:t>
             </a:fld>
             <a:endParaRPr lang="en-US"/>
           </a:p>
@@ -1602,7 +1602,7 @@
           <a:p>
             <a:fld id="{2BB8EE20-A5E2-47D3-8F6D-A2BA7AB2E093}" type="datetime1">
               <a:rPr lang="en-US" smtClean="0"/>
-              <a:t>7/8/2021</a:t>
+              <a:t>7/9/2021</a:t>
             </a:fld>
             <a:endParaRPr lang="en-US"/>
           </a:p>
@@ -2160,7 +2160,7 @@
           <a:p>
             <a:fld id="{3382CF99-132F-413F-B7EF-71A5C33F2ED6}" type="datetime1">
               <a:rPr lang="en-US" smtClean="0"/>
-              <a:t>7/8/2021</a:t>
+              <a:t>7/9/2021</a:t>
             </a:fld>
             <a:endParaRPr lang="en-US"/>
           </a:p>
@@ -2302,7 +2302,7 @@
           <a:p>
             <a:fld id="{1F17AE06-98E0-4D9F-A059-92C3548821BB}" type="datetime1">
               <a:rPr lang="en-US" smtClean="0"/>
-              <a:t>7/8/2021</a:t>
+              <a:t>7/9/2021</a:t>
             </a:fld>
             <a:endParaRPr lang="en-US"/>
           </a:p>
@@ -2415,7 +2415,7 @@
           <a:p>
             <a:fld id="{FFBA00CA-3DDC-4705-B840-978EF5EA0707}" type="datetime1">
               <a:rPr lang="en-US" smtClean="0"/>
-              <a:t>7/8/2021</a:t>
+              <a:t>7/9/2021</a:t>
             </a:fld>
             <a:endParaRPr lang="en-US"/>
           </a:p>
@@ -2734,7 +2734,7 @@
           <a:p>
             <a:fld id="{FC366D49-0BBA-4C5A-AD96-6448CA63451A}" type="datetime1">
               <a:rPr lang="en-US" smtClean="0"/>
-              <a:t>7/8/2021</a:t>
+              <a:t>7/9/2021</a:t>
             </a:fld>
             <a:endParaRPr lang="en-US"/>
           </a:p>
@@ -3031,7 +3031,7 @@
           <a:p>
             <a:fld id="{4F4EB293-A316-472D-A8B4-6947CF1A12B7}" type="datetime1">
               <a:rPr lang="en-US" smtClean="0"/>
-              <a:t>7/8/2021</a:t>
+              <a:t>7/9/2021</a:t>
             </a:fld>
             <a:endParaRPr lang="en-US"/>
           </a:p>
@@ -3310,7 +3310,7 @@
           <a:p>
             <a:fld id="{734BCCD4-CEB1-405B-A443-DD9CBCBEA552}" type="datetime1">
               <a:rPr lang="en-US" smtClean="0"/>
-              <a:t>7/8/2021</a:t>
+              <a:t>7/9/2021</a:t>
             </a:fld>
             <a:endParaRPr lang="en-US"/>
           </a:p>
@@ -5950,7 +5950,7 @@
         <p:spPr/>
         <p:txBody>
           <a:bodyPr>
-            <a:normAutofit/>
+            <a:normAutofit lnSpcReduction="10000"/>
           </a:bodyPr>
           <a:lstStyle/>
           <a:p>
@@ -5977,6 +5977,32 @@
             <a:r>
               <a:rPr lang="en-GB" dirty="0"/>
               <a:t> for a component flag says the component is not copy safe (requires user-defined copy constructor)</a:t>
+            </a:r>
+          </a:p>
+          <a:p>
+            <a:pPr marL="342900" indent="-342900">
+              <a:buFont typeface="Symbol" panose="05050102010706020507" pitchFamily="18" charset="2"/>
+              <a:buChar char="Þ"/>
+            </a:pPr>
+            <a:r>
+              <a:rPr lang="en-GB" dirty="0"/>
+              <a:t>In C++ lets say I store an entity which contains a std::vector or std::</a:t>
+            </a:r>
+            <a:r>
+              <a:rPr lang="en-GB" dirty="0" err="1"/>
+              <a:t>unordered_map</a:t>
+            </a:r>
+            <a:r>
+              <a:rPr lang="en-GB" dirty="0"/>
+              <a:t>, then my code will break because I do not call their constructors on </a:t>
+            </a:r>
+            <a:r>
+              <a:rPr lang="en-GB" dirty="0" err="1"/>
+              <a:t>realloc</a:t>
+            </a:r>
+            <a:r>
+              <a:rPr lang="en-GB" dirty="0"/>
+              <a:t>. In C I can guarantee that my types are POD and bit-copy safe.</a:t>
             </a:r>
           </a:p>
         </p:txBody>

</xml_diff>